<commit_message>
PM Teil von Fanny und mir
</commit_message>
<xml_diff>
--- a/MyCalendar.pptx
+++ b/MyCalendar.pptx
@@ -5,7 +5,7 @@
     <p:sldMasterId id="2147483747" r:id="rId1"/>
   </p:sldMasterIdLst>
   <p:notesMasterIdLst>
-    <p:notesMasterId r:id="rId14"/>
+    <p:notesMasterId r:id="rId21"/>
   </p:notesMasterIdLst>
   <p:sldIdLst>
     <p:sldId id="271" r:id="rId2"/>
@@ -19,7 +19,14 @@
     <p:sldId id="257" r:id="rId10"/>
     <p:sldId id="259" r:id="rId11"/>
     <p:sldId id="269" r:id="rId12"/>
-    <p:sldId id="261" r:id="rId13"/>
+    <p:sldId id="277" r:id="rId13"/>
+    <p:sldId id="272" r:id="rId14"/>
+    <p:sldId id="273" r:id="rId15"/>
+    <p:sldId id="274" r:id="rId16"/>
+    <p:sldId id="275" r:id="rId17"/>
+    <p:sldId id="276" r:id="rId18"/>
+    <p:sldId id="278" r:id="rId19"/>
+    <p:sldId id="261" r:id="rId20"/>
   </p:sldIdLst>
   <p:sldSz cx="12192000" cy="6858000"/>
   <p:notesSz cx="6858000" cy="9144000"/>
@@ -367,7 +374,7 @@
           <a:p>
             <a:fld id="{6BF6A645-7003-4BD1-A584-86606C70755C}" type="slidenum">
               <a:rPr lang="en-US" smtClean="0"/>
-              <a:t>‹Nr.›</a:t>
+              <a:t>‹#›</a:t>
             </a:fld>
             <a:endParaRPr lang="en-US"/>
           </a:p>
@@ -667,7 +674,7 @@
           <a:p>
             <a:fld id="{6D22F896-40B5-4ADD-8801-0D06FADFA095}" type="slidenum">
               <a:rPr lang="en-US" smtClean="0"/>
-              <a:t>‹Nr.›</a:t>
+              <a:t>‹#›</a:t>
             </a:fld>
             <a:endParaRPr lang="en-US" dirty="0"/>
           </a:p>
@@ -868,7 +875,7 @@
           <a:p>
             <a:fld id="{6D22F896-40B5-4ADD-8801-0D06FADFA095}" type="slidenum">
               <a:rPr lang="en-US" smtClean="0"/>
-              <a:t>‹Nr.›</a:t>
+              <a:t>‹#›</a:t>
             </a:fld>
             <a:endParaRPr lang="en-US" dirty="0"/>
           </a:p>
@@ -1083,7 +1090,7 @@
           <a:p>
             <a:fld id="{6D22F896-40B5-4ADD-8801-0D06FADFA095}" type="slidenum">
               <a:rPr lang="en-US" smtClean="0"/>
-              <a:t>‹Nr.›</a:t>
+              <a:t>‹#›</a:t>
             </a:fld>
             <a:endParaRPr lang="en-US" dirty="0"/>
           </a:p>
@@ -1289,7 +1296,7 @@
           <a:p>
             <a:fld id="{6D22F896-40B5-4ADD-8801-0D06FADFA095}" type="slidenum">
               <a:rPr lang="en-US" smtClean="0"/>
-              <a:t>‹Nr.›</a:t>
+              <a:t>‹#›</a:t>
             </a:fld>
             <a:endParaRPr lang="en-US" dirty="0"/>
           </a:p>
@@ -1573,7 +1580,7 @@
           <a:p>
             <a:fld id="{6D22F896-40B5-4ADD-8801-0D06FADFA095}" type="slidenum">
               <a:rPr lang="en-US" smtClean="0"/>
-              <a:t>‹Nr.›</a:t>
+              <a:t>‹#›</a:t>
             </a:fld>
             <a:endParaRPr lang="en-US" dirty="0"/>
           </a:p>
@@ -1841,7 +1848,7 @@
           <a:p>
             <a:fld id="{6D22F896-40B5-4ADD-8801-0D06FADFA095}" type="slidenum">
               <a:rPr lang="en-US" smtClean="0"/>
-              <a:t>‹Nr.›</a:t>
+              <a:t>‹#›</a:t>
             </a:fld>
             <a:endParaRPr lang="en-US" dirty="0"/>
           </a:p>
@@ -2257,7 +2264,7 @@
           <a:p>
             <a:fld id="{6D22F896-40B5-4ADD-8801-0D06FADFA095}" type="slidenum">
               <a:rPr lang="en-US" smtClean="0"/>
-              <a:t>‹Nr.›</a:t>
+              <a:t>‹#›</a:t>
             </a:fld>
             <a:endParaRPr lang="en-US" dirty="0"/>
           </a:p>
@@ -2406,7 +2413,7 @@
           <a:p>
             <a:fld id="{6D22F896-40B5-4ADD-8801-0D06FADFA095}" type="slidenum">
               <a:rPr lang="en-US" smtClean="0"/>
-              <a:t>‹Nr.›</a:t>
+              <a:t>‹#›</a:t>
             </a:fld>
             <a:endParaRPr lang="en-US" dirty="0"/>
           </a:p>
@@ -2532,7 +2539,7 @@
           <a:p>
             <a:fld id="{6D22F896-40B5-4ADD-8801-0D06FADFA095}" type="slidenum">
               <a:rPr lang="en-US" smtClean="0"/>
-              <a:t>‹Nr.›</a:t>
+              <a:t>‹#›</a:t>
             </a:fld>
             <a:endParaRPr lang="en-US" dirty="0"/>
           </a:p>
@@ -2783,7 +2790,7 @@
           <a:p>
             <a:fld id="{6D22F896-40B5-4ADD-8801-0D06FADFA095}" type="slidenum">
               <a:rPr lang="en-US" smtClean="0"/>
-              <a:t>‹Nr.›</a:t>
+              <a:t>‹#›</a:t>
             </a:fld>
             <a:endParaRPr lang="en-US" dirty="0"/>
           </a:p>
@@ -3233,7 +3240,7 @@
           <a:p>
             <a:fld id="{6D22F896-40B5-4ADD-8801-0D06FADFA095}" type="slidenum">
               <a:rPr lang="en-US" smtClean="0"/>
-              <a:t>‹Nr.›</a:t>
+              <a:t>‹#›</a:t>
             </a:fld>
             <a:endParaRPr lang="en-US" dirty="0"/>
           </a:p>
@@ -3590,7 +3597,7 @@
             <a:fld id="{6D22F896-40B5-4ADD-8801-0D06FADFA095}" type="slidenum">
               <a:rPr lang="en-US" smtClean="0"/>
               <a:pPr/>
-              <a:t>‹Nr.›</a:t>
+              <a:t>‹#›</a:t>
             </a:fld>
             <a:endParaRPr lang="en-US" dirty="0"/>
           </a:p>
@@ -4279,12 +4286,7 @@
             <p:ph type="title"/>
           </p:nvPr>
         </p:nvSpPr>
-        <p:spPr>
-          <a:xfrm>
-            <a:off x="2902142" y="804519"/>
-            <a:ext cx="6387717" cy="1049235"/>
-          </a:xfrm>
-        </p:spPr>
+        <p:spPr/>
         <p:txBody>
           <a:bodyPr>
             <a:normAutofit/>
@@ -4298,6 +4300,31 @@
               </a:rPr>
               <a:t>Projektmanagement</a:t>
             </a:r>
+          </a:p>
+        </p:txBody>
+      </p:sp>
+      <p:sp>
+        <p:nvSpPr>
+          <p:cNvPr id="4" name="Text Placeholder 3">
+            <a:extLst>
+              <a:ext uri="{FF2B5EF4-FFF2-40B4-BE49-F238E27FC236}">
+                <a16:creationId xmlns:a16="http://schemas.microsoft.com/office/drawing/2014/main" id="{D9CA96D2-8885-493B-AB60-899B720878F0}"/>
+              </a:ext>
+            </a:extLst>
+          </p:cNvPr>
+          <p:cNvSpPr>
+            <a:spLocks noGrp="1"/>
+          </p:cNvSpPr>
+          <p:nvPr>
+            <p:ph type="body" idx="1"/>
+          </p:nvPr>
+        </p:nvSpPr>
+        <p:spPr/>
+        <p:txBody>
+          <a:bodyPr/>
+          <a:lstStyle/>
+          <a:p>
+            <a:endParaRPr lang="de-DE"/>
           </a:p>
         </p:txBody>
       </p:sp>
@@ -4362,6 +4389,1068 @@
       </p:grpSpPr>
       <p:sp>
         <p:nvSpPr>
+          <p:cNvPr id="2" name="Title 1">
+            <a:extLst>
+              <a:ext uri="{FF2B5EF4-FFF2-40B4-BE49-F238E27FC236}">
+                <a16:creationId xmlns:a16="http://schemas.microsoft.com/office/drawing/2014/main" id="{B57DFF8B-EA63-4B71-86F3-C056D9E973A3}"/>
+              </a:ext>
+            </a:extLst>
+          </p:cNvPr>
+          <p:cNvSpPr>
+            <a:spLocks noGrp="1"/>
+          </p:cNvSpPr>
+          <p:nvPr>
+            <p:ph type="title"/>
+          </p:nvPr>
+        </p:nvSpPr>
+        <p:spPr/>
+        <p:txBody>
+          <a:bodyPr>
+            <a:normAutofit/>
+          </a:bodyPr>
+          <a:lstStyle/>
+          <a:p>
+            <a:r>
+              <a:rPr lang="de-DE" sz="4000" dirty="0"/>
+              <a:t>Teammanagement</a:t>
+            </a:r>
+          </a:p>
+        </p:txBody>
+      </p:sp>
+      <p:sp>
+        <p:nvSpPr>
+          <p:cNvPr id="3" name="Content Placeholder 2">
+            <a:extLst>
+              <a:ext uri="{FF2B5EF4-FFF2-40B4-BE49-F238E27FC236}">
+                <a16:creationId xmlns:a16="http://schemas.microsoft.com/office/drawing/2014/main" id="{7181CAE6-67AA-402B-9650-BE82841B2227}"/>
+              </a:ext>
+            </a:extLst>
+          </p:cNvPr>
+          <p:cNvSpPr>
+            <a:spLocks noGrp="1"/>
+          </p:cNvSpPr>
+          <p:nvPr>
+            <p:ph idx="1"/>
+          </p:nvPr>
+        </p:nvSpPr>
+        <p:spPr>
+          <a:xfrm>
+            <a:off x="1451579" y="2015732"/>
+            <a:ext cx="9603275" cy="3450613"/>
+          </a:xfrm>
+        </p:spPr>
+        <p:txBody>
+          <a:bodyPr>
+            <a:noAutofit/>
+          </a:bodyPr>
+          <a:lstStyle/>
+          <a:p>
+            <a:r>
+              <a:rPr lang="de-DE" sz="2800" dirty="0"/>
+              <a:t>Projektleiter: Nico</a:t>
+            </a:r>
+          </a:p>
+          <a:p>
+            <a:r>
+              <a:rPr lang="de-DE" sz="2800" dirty="0"/>
+              <a:t>Backend:  Yannik (Verantwortlicher), Clemens, Johannes</a:t>
+            </a:r>
+          </a:p>
+          <a:p>
+            <a:r>
+              <a:rPr lang="de-DE" sz="2800" dirty="0"/>
+              <a:t>Frontend: Nico (Verantwortlicher), Hanna, Fanny</a:t>
+            </a:r>
+          </a:p>
+          <a:p>
+            <a:r>
+              <a:rPr lang="de-DE" sz="2800" dirty="0"/>
+              <a:t>GitHub-Verantwortung: Yannik</a:t>
+            </a:r>
+          </a:p>
+          <a:p>
+            <a:r>
+              <a:rPr lang="de-DE" sz="2800" dirty="0"/>
+              <a:t>Qualitätssicherung Verantwortung: Johannes</a:t>
+            </a:r>
+          </a:p>
+        </p:txBody>
+      </p:sp>
+      <p:sp>
+        <p:nvSpPr>
+          <p:cNvPr id="4" name="Slide Number Placeholder 3">
+            <a:extLst>
+              <a:ext uri="{FF2B5EF4-FFF2-40B4-BE49-F238E27FC236}">
+                <a16:creationId xmlns:a16="http://schemas.microsoft.com/office/drawing/2014/main" id="{1EB0EF7C-C2BE-47B1-BB24-BC105BBF9C5B}"/>
+              </a:ext>
+            </a:extLst>
+          </p:cNvPr>
+          <p:cNvSpPr>
+            <a:spLocks noGrp="1"/>
+          </p:cNvSpPr>
+          <p:nvPr>
+            <p:ph type="sldNum" sz="quarter" idx="12"/>
+          </p:nvPr>
+        </p:nvSpPr>
+        <p:spPr/>
+        <p:txBody>
+          <a:bodyPr/>
+          <a:lstStyle/>
+          <a:p>
+            <a:fld id="{6D22F896-40B5-4ADD-8801-0D06FADFA095}" type="slidenum">
+              <a:rPr lang="en-US" smtClean="0"/>
+              <a:t>12</a:t>
+            </a:fld>
+            <a:endParaRPr lang="en-US" dirty="0"/>
+          </a:p>
+        </p:txBody>
+      </p:sp>
+    </p:spTree>
+    <p:extLst>
+      <p:ext uri="{BB962C8B-B14F-4D97-AF65-F5344CB8AC3E}">
+        <p14:creationId xmlns:p14="http://schemas.microsoft.com/office/powerpoint/2010/main" val="2394814548"/>
+      </p:ext>
+    </p:extLst>
+  </p:cSld>
+  <p:clrMapOvr>
+    <a:masterClrMapping/>
+  </p:clrMapOvr>
+</p:sld>
+</file>
+
+<file path=ppt/slides/slide13.xml><?xml version="1.0" encoding="utf-8"?>
+<p:sld xmlns:a="http://schemas.openxmlformats.org/drawingml/2006/main" xmlns:r="http://schemas.openxmlformats.org/officeDocument/2006/relationships" xmlns:p="http://schemas.openxmlformats.org/presentationml/2006/main">
+  <p:cSld>
+    <p:spTree>
+      <p:nvGrpSpPr>
+        <p:cNvPr id="1" name=""/>
+        <p:cNvGrpSpPr/>
+        <p:nvPr/>
+      </p:nvGrpSpPr>
+      <p:grpSpPr>
+        <a:xfrm>
+          <a:off x="0" y="0"/>
+          <a:ext cx="0" cy="0"/>
+          <a:chOff x="0" y="0"/>
+          <a:chExt cx="0" cy="0"/>
+        </a:xfrm>
+      </p:grpSpPr>
+      <p:sp>
+        <p:nvSpPr>
+          <p:cNvPr id="2" name="Title 1">
+            <a:extLst>
+              <a:ext uri="{FF2B5EF4-FFF2-40B4-BE49-F238E27FC236}">
+                <a16:creationId xmlns:a16="http://schemas.microsoft.com/office/drawing/2014/main" id="{C4DB5F21-D92D-4FB8-90BA-5E6A8FD43F55}"/>
+              </a:ext>
+            </a:extLst>
+          </p:cNvPr>
+          <p:cNvSpPr>
+            <a:spLocks noGrp="1"/>
+          </p:cNvSpPr>
+          <p:nvPr>
+            <p:ph type="title"/>
+          </p:nvPr>
+        </p:nvSpPr>
+        <p:spPr/>
+        <p:txBody>
+          <a:bodyPr>
+            <a:normAutofit/>
+          </a:bodyPr>
+          <a:lstStyle/>
+          <a:p>
+            <a:r>
+              <a:rPr lang="de-DE" sz="4000" dirty="0"/>
+              <a:t>Eingetretene Risiken</a:t>
+            </a:r>
+          </a:p>
+        </p:txBody>
+      </p:sp>
+      <p:sp>
+        <p:nvSpPr>
+          <p:cNvPr id="3" name="Content Placeholder 2">
+            <a:extLst>
+              <a:ext uri="{FF2B5EF4-FFF2-40B4-BE49-F238E27FC236}">
+                <a16:creationId xmlns:a16="http://schemas.microsoft.com/office/drawing/2014/main" id="{61446C36-25AC-4CB3-BC85-E173ED1B29A9}"/>
+              </a:ext>
+            </a:extLst>
+          </p:cNvPr>
+          <p:cNvSpPr>
+            <a:spLocks noGrp="1"/>
+          </p:cNvSpPr>
+          <p:nvPr>
+            <p:ph idx="1"/>
+          </p:nvPr>
+        </p:nvSpPr>
+        <p:spPr/>
+        <p:txBody>
+          <a:bodyPr>
+            <a:noAutofit/>
+          </a:bodyPr>
+          <a:lstStyle/>
+          <a:p>
+            <a:r>
+              <a:rPr lang="de-DE" sz="2800" dirty="0"/>
+              <a:t>Mitarbeiterausfälle </a:t>
+            </a:r>
+            <a:r>
+              <a:rPr lang="de-DE" sz="2800" dirty="0">
+                <a:sym typeface="Wingdings" panose="05000000000000000000" pitchFamily="2" charset="2"/>
+              </a:rPr>
+              <a:t> bei Aufgabenverteilung berücksichtigt</a:t>
+            </a:r>
+          </a:p>
+          <a:p>
+            <a:r>
+              <a:rPr lang="de-DE" sz="2800" dirty="0">
+                <a:sym typeface="Wingdings" panose="05000000000000000000" pitchFamily="2" charset="2"/>
+              </a:rPr>
+              <a:t>Kleine </a:t>
+            </a:r>
+            <a:r>
+              <a:rPr lang="de-DE" sz="2800" dirty="0" err="1">
+                <a:sym typeface="Wingdings" panose="05000000000000000000" pitchFamily="2" charset="2"/>
+              </a:rPr>
+              <a:t>Mergekonflikte</a:t>
+            </a:r>
+            <a:r>
+              <a:rPr lang="de-DE" sz="2800" dirty="0">
+                <a:sym typeface="Wingdings" panose="05000000000000000000" pitchFamily="2" charset="2"/>
+              </a:rPr>
+              <a:t>  durch Code-Review und gute Struktur frühzeitig gelöst</a:t>
+            </a:r>
+          </a:p>
+          <a:p>
+            <a:r>
+              <a:rPr lang="de-DE" sz="2800" dirty="0">
+                <a:sym typeface="Wingdings" panose="05000000000000000000" pitchFamily="2" charset="2"/>
+              </a:rPr>
+              <a:t>Gutes Wetter  Gegenmaßnahmen unerfolgreich</a:t>
+            </a:r>
+          </a:p>
+          <a:p>
+            <a:r>
+              <a:rPr lang="de-DE" sz="2800" dirty="0">
+                <a:sym typeface="Wingdings" panose="05000000000000000000" pitchFamily="2" charset="2"/>
+              </a:rPr>
+              <a:t>Kompatibilitätsprobleme von Browsern  frühzeitige Erkennung und Reparatur</a:t>
+            </a:r>
+            <a:endParaRPr lang="de-DE" sz="2800" dirty="0"/>
+          </a:p>
+        </p:txBody>
+      </p:sp>
+      <p:sp>
+        <p:nvSpPr>
+          <p:cNvPr id="4" name="Slide Number Placeholder 3">
+            <a:extLst>
+              <a:ext uri="{FF2B5EF4-FFF2-40B4-BE49-F238E27FC236}">
+                <a16:creationId xmlns:a16="http://schemas.microsoft.com/office/drawing/2014/main" id="{81959624-377F-477B-8F83-8D5807DE7D1D}"/>
+              </a:ext>
+            </a:extLst>
+          </p:cNvPr>
+          <p:cNvSpPr>
+            <a:spLocks noGrp="1"/>
+          </p:cNvSpPr>
+          <p:nvPr>
+            <p:ph type="sldNum" sz="quarter" idx="12"/>
+          </p:nvPr>
+        </p:nvSpPr>
+        <p:spPr/>
+        <p:txBody>
+          <a:bodyPr/>
+          <a:lstStyle/>
+          <a:p>
+            <a:fld id="{6D22F896-40B5-4ADD-8801-0D06FADFA095}" type="slidenum">
+              <a:rPr lang="en-US" smtClean="0"/>
+              <a:t>13</a:t>
+            </a:fld>
+            <a:endParaRPr lang="en-US" dirty="0"/>
+          </a:p>
+        </p:txBody>
+      </p:sp>
+    </p:spTree>
+    <p:extLst>
+      <p:ext uri="{BB962C8B-B14F-4D97-AF65-F5344CB8AC3E}">
+        <p14:creationId xmlns:p14="http://schemas.microsoft.com/office/powerpoint/2010/main" val="2693949351"/>
+      </p:ext>
+    </p:extLst>
+  </p:cSld>
+  <p:clrMapOvr>
+    <a:masterClrMapping/>
+  </p:clrMapOvr>
+</p:sld>
+</file>
+
+<file path=ppt/slides/slide14.xml><?xml version="1.0" encoding="utf-8"?>
+<p:sld xmlns:a="http://schemas.openxmlformats.org/drawingml/2006/main" xmlns:r="http://schemas.openxmlformats.org/officeDocument/2006/relationships" xmlns:p="http://schemas.openxmlformats.org/presentationml/2006/main">
+  <p:cSld>
+    <p:spTree>
+      <p:nvGrpSpPr>
+        <p:cNvPr id="1" name=""/>
+        <p:cNvGrpSpPr/>
+        <p:nvPr/>
+      </p:nvGrpSpPr>
+      <p:grpSpPr>
+        <a:xfrm>
+          <a:off x="0" y="0"/>
+          <a:ext cx="0" cy="0"/>
+          <a:chOff x="0" y="0"/>
+          <a:chExt cx="0" cy="0"/>
+        </a:xfrm>
+      </p:grpSpPr>
+      <p:sp>
+        <p:nvSpPr>
+          <p:cNvPr id="2" name="Title 1">
+            <a:extLst>
+              <a:ext uri="{FF2B5EF4-FFF2-40B4-BE49-F238E27FC236}">
+                <a16:creationId xmlns:a16="http://schemas.microsoft.com/office/drawing/2014/main" id="{02357C1D-31B6-461D-9088-0C0AB564DE63}"/>
+              </a:ext>
+            </a:extLst>
+          </p:cNvPr>
+          <p:cNvSpPr>
+            <a:spLocks noGrp="1"/>
+          </p:cNvSpPr>
+          <p:nvPr>
+            <p:ph type="title"/>
+          </p:nvPr>
+        </p:nvSpPr>
+        <p:spPr/>
+        <p:txBody>
+          <a:bodyPr>
+            <a:normAutofit/>
+          </a:bodyPr>
+          <a:lstStyle/>
+          <a:p>
+            <a:r>
+              <a:rPr lang="de-DE" sz="4000" dirty="0"/>
+              <a:t>Qualitätssicherung</a:t>
+            </a:r>
+          </a:p>
+        </p:txBody>
+      </p:sp>
+      <p:sp>
+        <p:nvSpPr>
+          <p:cNvPr id="3" name="Content Placeholder 2">
+            <a:extLst>
+              <a:ext uri="{FF2B5EF4-FFF2-40B4-BE49-F238E27FC236}">
+                <a16:creationId xmlns:a16="http://schemas.microsoft.com/office/drawing/2014/main" id="{88B22C36-7802-4EEE-A27D-7B4A8375DFDB}"/>
+              </a:ext>
+            </a:extLst>
+          </p:cNvPr>
+          <p:cNvSpPr>
+            <a:spLocks noGrp="1"/>
+          </p:cNvSpPr>
+          <p:nvPr>
+            <p:ph idx="1"/>
+          </p:nvPr>
+        </p:nvSpPr>
+        <p:spPr/>
+        <p:txBody>
+          <a:bodyPr>
+            <a:noAutofit/>
+          </a:bodyPr>
+          <a:lstStyle/>
+          <a:p>
+            <a:r>
+              <a:rPr lang="de-DE" sz="2800" dirty="0"/>
+              <a:t>Regelmäßige rechtzeitige Code-Reviews und kleinere Funktionsüberprüfungen</a:t>
+            </a:r>
+          </a:p>
+          <a:p>
+            <a:r>
+              <a:rPr lang="de-DE" sz="2800" dirty="0"/>
+              <a:t>GitHub-Hierarchie überwiegend sauber getrennt</a:t>
+            </a:r>
+          </a:p>
+          <a:p>
+            <a:r>
+              <a:rPr lang="de-DE" sz="2800" dirty="0"/>
+              <a:t>Regelmäßige und außerplanmäßige Meetings nach Bedarf</a:t>
+            </a:r>
+          </a:p>
+          <a:p>
+            <a:r>
+              <a:rPr lang="de-DE" sz="2800" dirty="0"/>
+              <a:t>4-Eyes-Coding und 6-Eyes-Coding </a:t>
+            </a:r>
+            <a:r>
+              <a:rPr lang="de-DE" sz="2800" dirty="0">
+                <a:sym typeface="Wingdings" panose="05000000000000000000" pitchFamily="2" charset="2"/>
+              </a:rPr>
+              <a:t></a:t>
+            </a:r>
+            <a:r>
+              <a:rPr lang="de-DE" sz="2800" dirty="0"/>
+              <a:t> erhöhte Arbeitseffizienz und frühzeitiges Erkennen von Fehlern</a:t>
+            </a:r>
+          </a:p>
+        </p:txBody>
+      </p:sp>
+      <p:sp>
+        <p:nvSpPr>
+          <p:cNvPr id="4" name="Slide Number Placeholder 3">
+            <a:extLst>
+              <a:ext uri="{FF2B5EF4-FFF2-40B4-BE49-F238E27FC236}">
+                <a16:creationId xmlns:a16="http://schemas.microsoft.com/office/drawing/2014/main" id="{B46398EC-1973-4344-88C2-3D6A8F9BC1C4}"/>
+              </a:ext>
+            </a:extLst>
+          </p:cNvPr>
+          <p:cNvSpPr>
+            <a:spLocks noGrp="1"/>
+          </p:cNvSpPr>
+          <p:nvPr>
+            <p:ph type="sldNum" sz="quarter" idx="12"/>
+          </p:nvPr>
+        </p:nvSpPr>
+        <p:spPr/>
+        <p:txBody>
+          <a:bodyPr/>
+          <a:lstStyle/>
+          <a:p>
+            <a:fld id="{6D22F896-40B5-4ADD-8801-0D06FADFA095}" type="slidenum">
+              <a:rPr lang="en-US" smtClean="0"/>
+              <a:t>14</a:t>
+            </a:fld>
+            <a:endParaRPr lang="en-US" dirty="0"/>
+          </a:p>
+        </p:txBody>
+      </p:sp>
+    </p:spTree>
+    <p:extLst>
+      <p:ext uri="{BB962C8B-B14F-4D97-AF65-F5344CB8AC3E}">
+        <p14:creationId xmlns:p14="http://schemas.microsoft.com/office/powerpoint/2010/main" val="2540245830"/>
+      </p:ext>
+    </p:extLst>
+  </p:cSld>
+  <p:clrMapOvr>
+    <a:masterClrMapping/>
+  </p:clrMapOvr>
+</p:sld>
+</file>
+
+<file path=ppt/slides/slide15.xml><?xml version="1.0" encoding="utf-8"?>
+<p:sld xmlns:a="http://schemas.openxmlformats.org/drawingml/2006/main" xmlns:r="http://schemas.openxmlformats.org/officeDocument/2006/relationships" xmlns:p="http://schemas.openxmlformats.org/presentationml/2006/main">
+  <p:cSld>
+    <p:spTree>
+      <p:nvGrpSpPr>
+        <p:cNvPr id="1" name=""/>
+        <p:cNvGrpSpPr/>
+        <p:nvPr/>
+      </p:nvGrpSpPr>
+      <p:grpSpPr>
+        <a:xfrm>
+          <a:off x="0" y="0"/>
+          <a:ext cx="0" cy="0"/>
+          <a:chOff x="0" y="0"/>
+          <a:chExt cx="0" cy="0"/>
+        </a:xfrm>
+      </p:grpSpPr>
+      <p:sp>
+        <p:nvSpPr>
+          <p:cNvPr id="2" name="Title 1">
+            <a:extLst>
+              <a:ext uri="{FF2B5EF4-FFF2-40B4-BE49-F238E27FC236}">
+                <a16:creationId xmlns:a16="http://schemas.microsoft.com/office/drawing/2014/main" id="{63300BEE-9F36-4396-8469-E2AB0F355395}"/>
+              </a:ext>
+            </a:extLst>
+          </p:cNvPr>
+          <p:cNvSpPr>
+            <a:spLocks noGrp="1"/>
+          </p:cNvSpPr>
+          <p:nvPr>
+            <p:ph type="title"/>
+          </p:nvPr>
+        </p:nvSpPr>
+        <p:spPr/>
+        <p:txBody>
+          <a:bodyPr>
+            <a:normAutofit/>
+          </a:bodyPr>
+          <a:lstStyle/>
+          <a:p>
+            <a:r>
+              <a:rPr lang="de-DE" sz="4000" dirty="0"/>
+              <a:t>Code Reviews - OVERVIEW</a:t>
+            </a:r>
+          </a:p>
+        </p:txBody>
+      </p:sp>
+      <p:sp>
+        <p:nvSpPr>
+          <p:cNvPr id="3" name="Content Placeholder 2">
+            <a:extLst>
+              <a:ext uri="{FF2B5EF4-FFF2-40B4-BE49-F238E27FC236}">
+                <a16:creationId xmlns:a16="http://schemas.microsoft.com/office/drawing/2014/main" id="{FC58AB9B-7AD3-471C-B0F1-4F8DC1D9A33E}"/>
+              </a:ext>
+            </a:extLst>
+          </p:cNvPr>
+          <p:cNvSpPr>
+            <a:spLocks noGrp="1"/>
+          </p:cNvSpPr>
+          <p:nvPr>
+            <p:ph idx="1"/>
+          </p:nvPr>
+        </p:nvSpPr>
+        <p:spPr/>
+        <p:txBody>
+          <a:bodyPr>
+            <a:normAutofit/>
+          </a:bodyPr>
+          <a:lstStyle/>
+          <a:p>
+            <a:r>
+              <a:rPr lang="de-DE" sz="2800" dirty="0"/>
+              <a:t>4 Code Reviews:</a:t>
+            </a:r>
+          </a:p>
+          <a:p>
+            <a:pPr lvl="1"/>
+            <a:r>
+              <a:rPr lang="de-DE" sz="2800" dirty="0"/>
+              <a:t>HTML-Grundgerüst / Prototyp</a:t>
+            </a:r>
+          </a:p>
+          <a:p>
+            <a:pPr lvl="1"/>
+            <a:r>
+              <a:rPr lang="de-DE" sz="2800" dirty="0"/>
+              <a:t>Backend-Funktionalität</a:t>
+            </a:r>
+          </a:p>
+          <a:p>
+            <a:pPr lvl="1"/>
+            <a:r>
+              <a:rPr lang="de-DE" sz="2800" dirty="0"/>
+              <a:t>Frontend und Design</a:t>
+            </a:r>
+          </a:p>
+          <a:p>
+            <a:pPr lvl="1"/>
+            <a:r>
+              <a:rPr lang="de-DE" sz="2800" dirty="0"/>
+              <a:t>Abschließende Gesamtbetrachtung</a:t>
+            </a:r>
+          </a:p>
+          <a:p>
+            <a:pPr marL="0" indent="0">
+              <a:buNone/>
+            </a:pPr>
+            <a:endParaRPr lang="de-DE" sz="2800" dirty="0"/>
+          </a:p>
+          <a:p>
+            <a:pPr lvl="1"/>
+            <a:endParaRPr lang="de-DE" sz="2800" dirty="0"/>
+          </a:p>
+        </p:txBody>
+      </p:sp>
+      <p:sp>
+        <p:nvSpPr>
+          <p:cNvPr id="4" name="Slide Number Placeholder 3">
+            <a:extLst>
+              <a:ext uri="{FF2B5EF4-FFF2-40B4-BE49-F238E27FC236}">
+                <a16:creationId xmlns:a16="http://schemas.microsoft.com/office/drawing/2014/main" id="{8496C936-1F6F-4713-AD29-410298A97CA4}"/>
+              </a:ext>
+            </a:extLst>
+          </p:cNvPr>
+          <p:cNvSpPr>
+            <a:spLocks noGrp="1"/>
+          </p:cNvSpPr>
+          <p:nvPr>
+            <p:ph type="sldNum" sz="quarter" idx="12"/>
+          </p:nvPr>
+        </p:nvSpPr>
+        <p:spPr/>
+        <p:txBody>
+          <a:bodyPr/>
+          <a:lstStyle/>
+          <a:p>
+            <a:fld id="{6D22F896-40B5-4ADD-8801-0D06FADFA095}" type="slidenum">
+              <a:rPr lang="en-US" smtClean="0"/>
+              <a:t>15</a:t>
+            </a:fld>
+            <a:endParaRPr lang="en-US" dirty="0"/>
+          </a:p>
+        </p:txBody>
+      </p:sp>
+    </p:spTree>
+    <p:extLst>
+      <p:ext uri="{BB962C8B-B14F-4D97-AF65-F5344CB8AC3E}">
+        <p14:creationId xmlns:p14="http://schemas.microsoft.com/office/powerpoint/2010/main" val="433713278"/>
+      </p:ext>
+    </p:extLst>
+  </p:cSld>
+  <p:clrMapOvr>
+    <a:masterClrMapping/>
+  </p:clrMapOvr>
+</p:sld>
+</file>
+
+<file path=ppt/slides/slide16.xml><?xml version="1.0" encoding="utf-8"?>
+<p:sld xmlns:a="http://schemas.openxmlformats.org/drawingml/2006/main" xmlns:r="http://schemas.openxmlformats.org/officeDocument/2006/relationships" xmlns:p="http://schemas.openxmlformats.org/presentationml/2006/main">
+  <p:cSld>
+    <p:spTree>
+      <p:nvGrpSpPr>
+        <p:cNvPr id="1" name=""/>
+        <p:cNvGrpSpPr/>
+        <p:nvPr/>
+      </p:nvGrpSpPr>
+      <p:grpSpPr>
+        <a:xfrm>
+          <a:off x="0" y="0"/>
+          <a:ext cx="0" cy="0"/>
+          <a:chOff x="0" y="0"/>
+          <a:chExt cx="0" cy="0"/>
+        </a:xfrm>
+      </p:grpSpPr>
+      <p:sp>
+        <p:nvSpPr>
+          <p:cNvPr id="2" name="Title 1">
+            <a:extLst>
+              <a:ext uri="{FF2B5EF4-FFF2-40B4-BE49-F238E27FC236}">
+                <a16:creationId xmlns:a16="http://schemas.microsoft.com/office/drawing/2014/main" id="{05B40B5A-1F4E-48DC-84B8-B95DBE9C3259}"/>
+              </a:ext>
+            </a:extLst>
+          </p:cNvPr>
+          <p:cNvSpPr>
+            <a:spLocks noGrp="1"/>
+          </p:cNvSpPr>
+          <p:nvPr>
+            <p:ph type="title"/>
+          </p:nvPr>
+        </p:nvSpPr>
+        <p:spPr/>
+        <p:txBody>
+          <a:bodyPr>
+            <a:normAutofit/>
+          </a:bodyPr>
+          <a:lstStyle/>
+          <a:p>
+            <a:r>
+              <a:rPr lang="de-DE" sz="4000" dirty="0"/>
+              <a:t>Code Reviews – Main Points</a:t>
+            </a:r>
+          </a:p>
+        </p:txBody>
+      </p:sp>
+      <p:sp>
+        <p:nvSpPr>
+          <p:cNvPr id="3" name="Content Placeholder 2">
+            <a:extLst>
+              <a:ext uri="{FF2B5EF4-FFF2-40B4-BE49-F238E27FC236}">
+                <a16:creationId xmlns:a16="http://schemas.microsoft.com/office/drawing/2014/main" id="{558681DF-91C3-4920-A83F-9E84C977A226}"/>
+              </a:ext>
+            </a:extLst>
+          </p:cNvPr>
+          <p:cNvSpPr>
+            <a:spLocks noGrp="1"/>
+          </p:cNvSpPr>
+          <p:nvPr>
+            <p:ph idx="1"/>
+          </p:nvPr>
+        </p:nvSpPr>
+        <p:spPr/>
+        <p:txBody>
+          <a:bodyPr>
+            <a:noAutofit/>
+          </a:bodyPr>
+          <a:lstStyle/>
+          <a:p>
+            <a:r>
+              <a:rPr lang="de-DE" sz="2800" dirty="0"/>
+              <a:t>Einzelne Logikfehler in Berechnungen und Funktionen</a:t>
+            </a:r>
+          </a:p>
+          <a:p>
+            <a:r>
+              <a:rPr lang="de-DE" sz="2800" dirty="0"/>
+              <a:t>XML-Konformität</a:t>
+            </a:r>
+          </a:p>
+          <a:p>
+            <a:r>
+              <a:rPr lang="de-DE" sz="2800" dirty="0"/>
+              <a:t>Bezeichnung von Elementen (IDs, Klassen, Variablen, …) </a:t>
+            </a:r>
+          </a:p>
+          <a:p>
+            <a:r>
+              <a:rPr lang="de-DE" sz="2800" dirty="0"/>
+              <a:t>Codeformatierung + mangelnde Dokumentation</a:t>
+            </a:r>
+          </a:p>
+          <a:p>
+            <a:endParaRPr lang="de-DE" sz="2800" dirty="0"/>
+          </a:p>
+          <a:p>
+            <a:endParaRPr lang="de-DE" sz="2800" dirty="0"/>
+          </a:p>
+        </p:txBody>
+      </p:sp>
+      <p:sp>
+        <p:nvSpPr>
+          <p:cNvPr id="4" name="Slide Number Placeholder 3">
+            <a:extLst>
+              <a:ext uri="{FF2B5EF4-FFF2-40B4-BE49-F238E27FC236}">
+                <a16:creationId xmlns:a16="http://schemas.microsoft.com/office/drawing/2014/main" id="{12C17456-7094-47F3-8A72-72A2F754F787}"/>
+              </a:ext>
+            </a:extLst>
+          </p:cNvPr>
+          <p:cNvSpPr>
+            <a:spLocks noGrp="1"/>
+          </p:cNvSpPr>
+          <p:nvPr>
+            <p:ph type="sldNum" sz="quarter" idx="12"/>
+          </p:nvPr>
+        </p:nvSpPr>
+        <p:spPr/>
+        <p:txBody>
+          <a:bodyPr/>
+          <a:lstStyle/>
+          <a:p>
+            <a:fld id="{6D22F896-40B5-4ADD-8801-0D06FADFA095}" type="slidenum">
+              <a:rPr lang="en-US" smtClean="0"/>
+              <a:t>16</a:t>
+            </a:fld>
+            <a:endParaRPr lang="en-US" dirty="0"/>
+          </a:p>
+        </p:txBody>
+      </p:sp>
+    </p:spTree>
+    <p:extLst>
+      <p:ext uri="{BB962C8B-B14F-4D97-AF65-F5344CB8AC3E}">
+        <p14:creationId xmlns:p14="http://schemas.microsoft.com/office/powerpoint/2010/main" val="4280001683"/>
+      </p:ext>
+    </p:extLst>
+  </p:cSld>
+  <p:clrMapOvr>
+    <a:masterClrMapping/>
+  </p:clrMapOvr>
+</p:sld>
+</file>
+
+<file path=ppt/slides/slide17.xml><?xml version="1.0" encoding="utf-8"?>
+<p:sld xmlns:a="http://schemas.openxmlformats.org/drawingml/2006/main" xmlns:r="http://schemas.openxmlformats.org/officeDocument/2006/relationships" xmlns:p="http://schemas.openxmlformats.org/presentationml/2006/main">
+  <p:cSld>
+    <p:spTree>
+      <p:nvGrpSpPr>
+        <p:cNvPr id="1" name=""/>
+        <p:cNvGrpSpPr/>
+        <p:nvPr/>
+      </p:nvGrpSpPr>
+      <p:grpSpPr>
+        <a:xfrm>
+          <a:off x="0" y="0"/>
+          <a:ext cx="0" cy="0"/>
+          <a:chOff x="0" y="0"/>
+          <a:chExt cx="0" cy="0"/>
+        </a:xfrm>
+      </p:grpSpPr>
+      <p:sp>
+        <p:nvSpPr>
+          <p:cNvPr id="2" name="Title 1">
+            <a:extLst>
+              <a:ext uri="{FF2B5EF4-FFF2-40B4-BE49-F238E27FC236}">
+                <a16:creationId xmlns:a16="http://schemas.microsoft.com/office/drawing/2014/main" id="{2480844C-FEE8-41E0-BE26-CE25A7729435}"/>
+              </a:ext>
+            </a:extLst>
+          </p:cNvPr>
+          <p:cNvSpPr>
+            <a:spLocks noGrp="1"/>
+          </p:cNvSpPr>
+          <p:nvPr>
+            <p:ph type="title"/>
+          </p:nvPr>
+        </p:nvSpPr>
+        <p:spPr/>
+        <p:txBody>
+          <a:bodyPr>
+            <a:normAutofit/>
+          </a:bodyPr>
+          <a:lstStyle/>
+          <a:p>
+            <a:r>
+              <a:rPr lang="de-DE" sz="4000" dirty="0"/>
+              <a:t>Terminplanung</a:t>
+            </a:r>
+          </a:p>
+        </p:txBody>
+      </p:sp>
+      <p:sp>
+        <p:nvSpPr>
+          <p:cNvPr id="3" name="Content Placeholder 2">
+            <a:extLst>
+              <a:ext uri="{FF2B5EF4-FFF2-40B4-BE49-F238E27FC236}">
+                <a16:creationId xmlns:a16="http://schemas.microsoft.com/office/drawing/2014/main" id="{A869B970-7A8E-4129-A0BF-46E8AC92AEB8}"/>
+              </a:ext>
+            </a:extLst>
+          </p:cNvPr>
+          <p:cNvSpPr>
+            <a:spLocks noGrp="1"/>
+          </p:cNvSpPr>
+          <p:nvPr>
+            <p:ph idx="1"/>
+          </p:nvPr>
+        </p:nvSpPr>
+        <p:spPr/>
+        <p:txBody>
+          <a:bodyPr>
+            <a:normAutofit lnSpcReduction="10000"/>
+          </a:bodyPr>
+          <a:lstStyle/>
+          <a:p>
+            <a:r>
+              <a:rPr lang="de-DE" sz="2800" dirty="0"/>
+              <a:t>Zu Beginn sehr pünktlich (1. Code-Review,  Prototyp)</a:t>
+            </a:r>
+          </a:p>
+          <a:p>
+            <a:r>
+              <a:rPr lang="de-DE" sz="2800" dirty="0"/>
+              <a:t>Minimale Abweichungen im Terminplan (1-2 Tage für 2. und 3. Code-Review)</a:t>
+            </a:r>
+          </a:p>
+          <a:p>
+            <a:r>
+              <a:rPr lang="de-DE" sz="2800" dirty="0"/>
+              <a:t>Letztes Code-Review 5 Tage verspätet</a:t>
+            </a:r>
+          </a:p>
+          <a:p>
+            <a:r>
+              <a:rPr lang="de-DE" sz="2800" dirty="0"/>
+              <a:t>Maßnahme: 1 Woche Pufferzeit eingeplant</a:t>
+            </a:r>
+          </a:p>
+          <a:p>
+            <a:r>
+              <a:rPr lang="de-DE" sz="2800" dirty="0"/>
+              <a:t>Fazit: pünktlicher Projektabschluss möglich</a:t>
+            </a:r>
+          </a:p>
+          <a:p>
+            <a:endParaRPr lang="de-DE" dirty="0"/>
+          </a:p>
+        </p:txBody>
+      </p:sp>
+      <p:sp>
+        <p:nvSpPr>
+          <p:cNvPr id="4" name="Slide Number Placeholder 3">
+            <a:extLst>
+              <a:ext uri="{FF2B5EF4-FFF2-40B4-BE49-F238E27FC236}">
+                <a16:creationId xmlns:a16="http://schemas.microsoft.com/office/drawing/2014/main" id="{2D27E584-E719-4F5C-AD4E-5F2187771D1C}"/>
+              </a:ext>
+            </a:extLst>
+          </p:cNvPr>
+          <p:cNvSpPr>
+            <a:spLocks noGrp="1"/>
+          </p:cNvSpPr>
+          <p:nvPr>
+            <p:ph type="sldNum" sz="quarter" idx="12"/>
+          </p:nvPr>
+        </p:nvSpPr>
+        <p:spPr/>
+        <p:txBody>
+          <a:bodyPr/>
+          <a:lstStyle/>
+          <a:p>
+            <a:fld id="{6D22F896-40B5-4ADD-8801-0D06FADFA095}" type="slidenum">
+              <a:rPr lang="en-US" smtClean="0"/>
+              <a:t>17</a:t>
+            </a:fld>
+            <a:endParaRPr lang="en-US" dirty="0"/>
+          </a:p>
+        </p:txBody>
+      </p:sp>
+    </p:spTree>
+    <p:extLst>
+      <p:ext uri="{BB962C8B-B14F-4D97-AF65-F5344CB8AC3E}">
+        <p14:creationId xmlns:p14="http://schemas.microsoft.com/office/powerpoint/2010/main" val="3628023916"/>
+      </p:ext>
+    </p:extLst>
+  </p:cSld>
+  <p:clrMapOvr>
+    <a:masterClrMapping/>
+  </p:clrMapOvr>
+</p:sld>
+</file>
+
+<file path=ppt/slides/slide18.xml><?xml version="1.0" encoding="utf-8"?>
+<p:sld xmlns:a="http://schemas.openxmlformats.org/drawingml/2006/main" xmlns:r="http://schemas.openxmlformats.org/officeDocument/2006/relationships" xmlns:p="http://schemas.openxmlformats.org/presentationml/2006/main">
+  <p:cSld>
+    <p:spTree>
+      <p:nvGrpSpPr>
+        <p:cNvPr id="1" name=""/>
+        <p:cNvGrpSpPr/>
+        <p:nvPr/>
+      </p:nvGrpSpPr>
+      <p:grpSpPr>
+        <a:xfrm>
+          <a:off x="0" y="0"/>
+          <a:ext cx="0" cy="0"/>
+          <a:chOff x="0" y="0"/>
+          <a:chExt cx="0" cy="0"/>
+        </a:xfrm>
+      </p:grpSpPr>
+      <p:sp>
+        <p:nvSpPr>
+          <p:cNvPr id="2" name="Title 1">
+            <a:extLst>
+              <a:ext uri="{FF2B5EF4-FFF2-40B4-BE49-F238E27FC236}">
+                <a16:creationId xmlns:a16="http://schemas.microsoft.com/office/drawing/2014/main" id="{7123C3C8-0F04-4F53-A1A6-8A0C2BD7FA03}"/>
+              </a:ext>
+            </a:extLst>
+          </p:cNvPr>
+          <p:cNvSpPr>
+            <a:spLocks noGrp="1"/>
+          </p:cNvSpPr>
+          <p:nvPr>
+            <p:ph type="title"/>
+          </p:nvPr>
+        </p:nvSpPr>
+        <p:spPr/>
+        <p:txBody>
+          <a:bodyPr/>
+          <a:lstStyle/>
+          <a:p>
+            <a:r>
+              <a:rPr lang="de-DE" dirty="0"/>
+              <a:t>STIMMUNG IM TEAM</a:t>
+            </a:r>
+          </a:p>
+        </p:txBody>
+      </p:sp>
+      <p:sp>
+        <p:nvSpPr>
+          <p:cNvPr id="3" name="Content Placeholder 2">
+            <a:extLst>
+              <a:ext uri="{FF2B5EF4-FFF2-40B4-BE49-F238E27FC236}">
+                <a16:creationId xmlns:a16="http://schemas.microsoft.com/office/drawing/2014/main" id="{CBE3BC58-775C-437B-8C91-518571DF7B8E}"/>
+              </a:ext>
+            </a:extLst>
+          </p:cNvPr>
+          <p:cNvSpPr>
+            <a:spLocks noGrp="1"/>
+          </p:cNvSpPr>
+          <p:nvPr>
+            <p:ph idx="1"/>
+          </p:nvPr>
+        </p:nvSpPr>
+        <p:spPr/>
+        <p:txBody>
+          <a:bodyPr/>
+          <a:lstStyle/>
+          <a:p>
+            <a:endParaRPr lang="de-DE" dirty="0"/>
+          </a:p>
+        </p:txBody>
+      </p:sp>
+      <p:sp>
+        <p:nvSpPr>
+          <p:cNvPr id="4" name="Slide Number Placeholder 3">
+            <a:extLst>
+              <a:ext uri="{FF2B5EF4-FFF2-40B4-BE49-F238E27FC236}">
+                <a16:creationId xmlns:a16="http://schemas.microsoft.com/office/drawing/2014/main" id="{787A8457-6967-4DF1-9171-375B45C50A3E}"/>
+              </a:ext>
+            </a:extLst>
+          </p:cNvPr>
+          <p:cNvSpPr>
+            <a:spLocks noGrp="1"/>
+          </p:cNvSpPr>
+          <p:nvPr>
+            <p:ph type="sldNum" sz="quarter" idx="12"/>
+          </p:nvPr>
+        </p:nvSpPr>
+        <p:spPr/>
+        <p:txBody>
+          <a:bodyPr/>
+          <a:lstStyle/>
+          <a:p>
+            <a:fld id="{6D22F896-40B5-4ADD-8801-0D06FADFA095}" type="slidenum">
+              <a:rPr lang="en-US" smtClean="0"/>
+              <a:t>18</a:t>
+            </a:fld>
+            <a:endParaRPr lang="en-US" dirty="0"/>
+          </a:p>
+        </p:txBody>
+      </p:sp>
+      <p:pic>
+        <p:nvPicPr>
+          <p:cNvPr id="1026" name="Picture 2" descr="Google Formulare-Antwortdiagramm. Titel der Frage: Gesamtzufriedenheit. Anzahl der Antworten: 6 Antworten.">
+            <a:extLst>
+              <a:ext uri="{FF2B5EF4-FFF2-40B4-BE49-F238E27FC236}">
+                <a16:creationId xmlns:a16="http://schemas.microsoft.com/office/drawing/2014/main" id="{0552E097-8E01-4EF1-A4AA-B783FE800055}"/>
+              </a:ext>
+            </a:extLst>
+          </p:cNvPr>
+          <p:cNvPicPr>
+            <a:picLocks noChangeAspect="1" noChangeArrowheads="1"/>
+          </p:cNvPicPr>
+          <p:nvPr/>
+        </p:nvPicPr>
+        <p:blipFill>
+          <a:blip r:embed="rId2">
+            <a:extLst>
+              <a:ext uri="{28A0092B-C50C-407E-A947-70E740481C1C}">
+                <a14:useLocalDpi xmlns:a14="http://schemas.microsoft.com/office/drawing/2010/main" val="0"/>
+              </a:ext>
+            </a:extLst>
+          </a:blip>
+          <a:srcRect/>
+          <a:stretch>
+            <a:fillRect/>
+          </a:stretch>
+        </p:blipFill>
+        <p:spPr bwMode="auto">
+          <a:xfrm>
+            <a:off x="2458279" y="2015732"/>
+            <a:ext cx="7589873" cy="3608155"/>
+          </a:xfrm>
+          <a:prstGeom prst="rect">
+            <a:avLst/>
+          </a:prstGeom>
+          <a:noFill/>
+          <a:extLst>
+            <a:ext uri="{909E8E84-426E-40DD-AFC4-6F175D3DCCD1}">
+              <a14:hiddenFill xmlns:a14="http://schemas.microsoft.com/office/drawing/2010/main">
+                <a:solidFill>
+                  <a:srgbClr val="FFFFFF"/>
+                </a:solidFill>
+              </a14:hiddenFill>
+            </a:ext>
+          </a:extLst>
+        </p:spPr>
+      </p:pic>
+    </p:spTree>
+    <p:extLst>
+      <p:ext uri="{BB962C8B-B14F-4D97-AF65-F5344CB8AC3E}">
+        <p14:creationId xmlns:p14="http://schemas.microsoft.com/office/powerpoint/2010/main" val="3657634146"/>
+      </p:ext>
+    </p:extLst>
+  </p:cSld>
+  <p:clrMapOvr>
+    <a:masterClrMapping/>
+  </p:clrMapOvr>
+</p:sld>
+</file>
+
+<file path=ppt/slides/slide19.xml><?xml version="1.0" encoding="utf-8"?>
+<p:sld xmlns:a="http://schemas.openxmlformats.org/drawingml/2006/main" xmlns:r="http://schemas.openxmlformats.org/officeDocument/2006/relationships" xmlns:p="http://schemas.openxmlformats.org/presentationml/2006/main">
+  <p:cSld>
+    <p:spTree>
+      <p:nvGrpSpPr>
+        <p:cNvPr id="1" name=""/>
+        <p:cNvGrpSpPr/>
+        <p:nvPr/>
+      </p:nvGrpSpPr>
+      <p:grpSpPr>
+        <a:xfrm>
+          <a:off x="0" y="0"/>
+          <a:ext cx="0" cy="0"/>
+          <a:chOff x="0" y="0"/>
+          <a:chExt cx="0" cy="0"/>
+        </a:xfrm>
+      </p:grpSpPr>
+      <p:sp>
+        <p:nvSpPr>
           <p:cNvPr id="2" name="Titel 1">
             <a:extLst>
               <a:ext uri="{FF2B5EF4-FFF2-40B4-BE49-F238E27FC236}">
@@ -4653,7 +5742,7 @@
           <a:p>
             <a:fld id="{6D22F896-40B5-4ADD-8801-0D06FADFA095}" type="slidenum">
               <a:rPr lang="en-US" smtClean="0"/>
-              <a:t>12</a:t>
+              <a:t>19</a:t>
             </a:fld>
             <a:endParaRPr lang="en-US" dirty="0"/>
           </a:p>

</xml_diff>

<commit_message>
Richtiges struktur-img eingebunden upsi
</commit_message>
<xml_diff>
--- a/MyCalendar.pptx
+++ b/MyCalendar.pptx
@@ -215,7 +215,7 @@
           <a:p>
             <a:fld id="{55993831-0524-48AF-AF9B-5E940443D076}" type="datetimeFigureOut">
               <a:rPr lang="en-US" smtClean="0"/>
-              <a:t>7/18/2021</a:t>
+              <a:t>7/19/2021</a:t>
             </a:fld>
             <a:endParaRPr lang="en-US"/>
           </a:p>
@@ -374,7 +374,7 @@
           <a:p>
             <a:fld id="{6BF6A645-7003-4BD1-A584-86606C70755C}" type="slidenum">
               <a:rPr lang="en-US" smtClean="0"/>
-              <a:t>‹#›</a:t>
+              <a:t>‹Nr.›</a:t>
             </a:fld>
             <a:endParaRPr lang="en-US"/>
           </a:p>
@@ -622,7 +622,7 @@
           <a:p>
             <a:fld id="{41DB2E67-1C82-4950-B72A-0EE220AAFF1D}" type="datetime1">
               <a:rPr lang="en-US" smtClean="0"/>
-              <a:t>7/18/2021</a:t>
+              <a:t>7/19/2021</a:t>
             </a:fld>
             <a:endParaRPr lang="en-US" dirty="0"/>
           </a:p>
@@ -674,7 +674,7 @@
           <a:p>
             <a:fld id="{6D22F896-40B5-4ADD-8801-0D06FADFA095}" type="slidenum">
               <a:rPr lang="en-US" smtClean="0"/>
-              <a:t>‹#›</a:t>
+              <a:t>‹Nr.›</a:t>
             </a:fld>
             <a:endParaRPr lang="en-US" dirty="0"/>
           </a:p>
@@ -833,7 +833,7 @@
           <a:p>
             <a:fld id="{2FB05DCC-1CC0-4EDF-8D7E-1731C9BFD3C2}" type="datetime1">
               <a:rPr lang="en-US" smtClean="0"/>
-              <a:t>7/18/2021</a:t>
+              <a:t>7/19/2021</a:t>
             </a:fld>
             <a:endParaRPr lang="en-US" dirty="0"/>
           </a:p>
@@ -875,7 +875,7 @@
           <a:p>
             <a:fld id="{6D22F896-40B5-4ADD-8801-0D06FADFA095}" type="slidenum">
               <a:rPr lang="en-US" smtClean="0"/>
-              <a:t>‹#›</a:t>
+              <a:t>‹Nr.›</a:t>
             </a:fld>
             <a:endParaRPr lang="en-US" dirty="0"/>
           </a:p>
@@ -1048,7 +1048,7 @@
           <a:p>
             <a:fld id="{38CD1C69-A5AA-4036-98BB-7A8DF40362BC}" type="datetime1">
               <a:rPr lang="en-US" smtClean="0"/>
-              <a:t>7/18/2021</a:t>
+              <a:t>7/19/2021</a:t>
             </a:fld>
             <a:endParaRPr lang="en-US" dirty="0"/>
           </a:p>
@@ -1090,7 +1090,7 @@
           <a:p>
             <a:fld id="{6D22F896-40B5-4ADD-8801-0D06FADFA095}" type="slidenum">
               <a:rPr lang="en-US" smtClean="0"/>
-              <a:t>‹#›</a:t>
+              <a:t>‹Nr.›</a:t>
             </a:fld>
             <a:endParaRPr lang="en-US" dirty="0"/>
           </a:p>
@@ -1249,7 +1249,7 @@
           <a:p>
             <a:fld id="{319B177E-D436-4331-8BD2-846B99EBF23C}" type="datetime1">
               <a:rPr lang="en-US" smtClean="0"/>
-              <a:t>7/18/2021</a:t>
+              <a:t>7/19/2021</a:t>
             </a:fld>
             <a:endParaRPr lang="en-US" dirty="0"/>
           </a:p>
@@ -1296,7 +1296,7 @@
           <a:p>
             <a:fld id="{6D22F896-40B5-4ADD-8801-0D06FADFA095}" type="slidenum">
               <a:rPr lang="en-US" smtClean="0"/>
-              <a:t>‹#›</a:t>
+              <a:t>‹Nr.›</a:t>
             </a:fld>
             <a:endParaRPr lang="en-US" dirty="0"/>
           </a:p>
@@ -1533,7 +1533,7 @@
           <a:p>
             <a:fld id="{CA22A7A4-FD9C-4341-826C-F9722154E7AC}" type="datetime1">
               <a:rPr lang="en-US" smtClean="0"/>
-              <a:t>7/18/2021</a:t>
+              <a:t>7/19/2021</a:t>
             </a:fld>
             <a:endParaRPr lang="en-US" dirty="0"/>
           </a:p>
@@ -1580,7 +1580,7 @@
           <a:p>
             <a:fld id="{6D22F896-40B5-4ADD-8801-0D06FADFA095}" type="slidenum">
               <a:rPr lang="en-US" smtClean="0"/>
-              <a:t>‹#›</a:t>
+              <a:t>‹Nr.›</a:t>
             </a:fld>
             <a:endParaRPr lang="en-US" dirty="0"/>
           </a:p>
@@ -1806,7 +1806,7 @@
           <a:p>
             <a:fld id="{4605AAB2-C2F2-4A01-8E35-064F889621DC}" type="datetime1">
               <a:rPr lang="en-US" smtClean="0"/>
-              <a:t>7/18/2021</a:t>
+              <a:t>7/19/2021</a:t>
             </a:fld>
             <a:endParaRPr lang="en-US" dirty="0"/>
           </a:p>
@@ -1848,7 +1848,7 @@
           <a:p>
             <a:fld id="{6D22F896-40B5-4ADD-8801-0D06FADFA095}" type="slidenum">
               <a:rPr lang="en-US" smtClean="0"/>
-              <a:t>‹#›</a:t>
+              <a:t>‹Nr.›</a:t>
             </a:fld>
             <a:endParaRPr lang="en-US" dirty="0"/>
           </a:p>
@@ -2222,7 +2222,7 @@
           <a:p>
             <a:fld id="{49C54D22-6BC8-4D75-9D44-5E9766B940C4}" type="datetime1">
               <a:rPr lang="en-US" smtClean="0"/>
-              <a:t>7/18/2021</a:t>
+              <a:t>7/19/2021</a:t>
             </a:fld>
             <a:endParaRPr lang="en-US" dirty="0"/>
           </a:p>
@@ -2264,7 +2264,7 @@
           <a:p>
             <a:fld id="{6D22F896-40B5-4ADD-8801-0D06FADFA095}" type="slidenum">
               <a:rPr lang="en-US" smtClean="0"/>
-              <a:t>‹#›</a:t>
+              <a:t>‹Nr.›</a:t>
             </a:fld>
             <a:endParaRPr lang="en-US" dirty="0"/>
           </a:p>
@@ -2371,7 +2371,7 @@
           <a:p>
             <a:fld id="{80B38B87-3B4D-4816-838B-7C8C1D2026BC}" type="datetime1">
               <a:rPr lang="en-US" smtClean="0"/>
-              <a:t>7/18/2021</a:t>
+              <a:t>7/19/2021</a:t>
             </a:fld>
             <a:endParaRPr lang="en-US" dirty="0"/>
           </a:p>
@@ -2413,7 +2413,7 @@
           <a:p>
             <a:fld id="{6D22F896-40B5-4ADD-8801-0D06FADFA095}" type="slidenum">
               <a:rPr lang="en-US" smtClean="0"/>
-              <a:t>‹#›</a:t>
+              <a:t>‹Nr.›</a:t>
             </a:fld>
             <a:endParaRPr lang="en-US" dirty="0"/>
           </a:p>
@@ -2497,7 +2497,7 @@
           <a:p>
             <a:fld id="{C5F3181C-54D4-41C9-B3FA-0AD324E17C01}" type="datetime1">
               <a:rPr lang="en-US" smtClean="0"/>
-              <a:t>7/18/2021</a:t>
+              <a:t>7/19/2021</a:t>
             </a:fld>
             <a:endParaRPr lang="en-US" dirty="0"/>
           </a:p>
@@ -2539,7 +2539,7 @@
           <a:p>
             <a:fld id="{6D22F896-40B5-4ADD-8801-0D06FADFA095}" type="slidenum">
               <a:rPr lang="en-US" smtClean="0"/>
-              <a:t>‹#›</a:t>
+              <a:t>‹Nr.›</a:t>
             </a:fld>
             <a:endParaRPr lang="en-US" dirty="0"/>
           </a:p>
@@ -2748,7 +2748,7 @@
           <a:p>
             <a:fld id="{106FA281-5BEB-48CD-B854-4B37FAAB6BF8}" type="datetime1">
               <a:rPr lang="en-US" smtClean="0"/>
-              <a:t>7/18/2021</a:t>
+              <a:t>7/19/2021</a:t>
             </a:fld>
             <a:endParaRPr lang="en-US" dirty="0"/>
           </a:p>
@@ -2790,7 +2790,7 @@
           <a:p>
             <a:fld id="{6D22F896-40B5-4ADD-8801-0D06FADFA095}" type="slidenum">
               <a:rPr lang="en-US" smtClean="0"/>
-              <a:t>‹#›</a:t>
+              <a:t>‹Nr.›</a:t>
             </a:fld>
             <a:endParaRPr lang="en-US" dirty="0"/>
           </a:p>
@@ -3193,7 +3193,7 @@
           <a:p>
             <a:fld id="{6F24F85C-2425-4684-A5AF-B2192D97D451}" type="datetime1">
               <a:rPr lang="en-US" smtClean="0"/>
-              <a:t>7/18/2021</a:t>
+              <a:t>7/19/2021</a:t>
             </a:fld>
             <a:endParaRPr lang="en-US" dirty="0"/>
           </a:p>
@@ -3240,7 +3240,7 @@
           <a:p>
             <a:fld id="{6D22F896-40B5-4ADD-8801-0D06FADFA095}" type="slidenum">
               <a:rPr lang="en-US" smtClean="0"/>
-              <a:t>‹#›</a:t>
+              <a:t>‹Nr.›</a:t>
             </a:fld>
             <a:endParaRPr lang="en-US" dirty="0"/>
           </a:p>
@@ -3520,7 +3520,7 @@
           <a:p>
             <a:fld id="{DBB6CEE9-70B1-46C6-94BF-57B8B3907E1D}" type="datetime1">
               <a:rPr lang="en-US" smtClean="0"/>
-              <a:t>7/18/2021</a:t>
+              <a:t>7/19/2021</a:t>
             </a:fld>
             <a:endParaRPr lang="en-US" dirty="0"/>
           </a:p>
@@ -3597,7 +3597,7 @@
             <a:fld id="{6D22F896-40B5-4ADD-8801-0D06FADFA095}" type="slidenum">
               <a:rPr lang="en-US" smtClean="0"/>
               <a:pPr/>
-              <a:t>‹#›</a:t>
+              <a:t>‹Nr.›</a:t>
             </a:fld>
             <a:endParaRPr lang="en-US" dirty="0"/>
           </a:p>
@@ -7300,31 +7300,51 @@
       </p:sp>
       <p:pic>
         <p:nvPicPr>
-          <p:cNvPr id="8" name="Inhaltsplatzhalter 7">
+          <p:cNvPr id="1028" name="Picture 4">
             <a:extLst>
               <a:ext uri="{FF2B5EF4-FFF2-40B4-BE49-F238E27FC236}">
-                <a16:creationId xmlns:a16="http://schemas.microsoft.com/office/drawing/2014/main" id="{9D716AF5-E4FE-4096-A0E7-FA59D8A2DC71}"/>
+                <a16:creationId xmlns:a16="http://schemas.microsoft.com/office/drawing/2014/main" id="{6101E27E-5849-4BDC-B340-C955381778D6}"/>
               </a:ext>
             </a:extLst>
           </p:cNvPr>
           <p:cNvPicPr>
-            <a:picLocks noGrp="1" noChangeAspect="1"/>
+            <a:picLocks noGrp="1" noChangeAspect="1" noChangeArrowheads="1"/>
           </p:cNvPicPr>
           <p:nvPr>
             <p:ph idx="1"/>
           </p:nvPr>
         </p:nvPicPr>
         <p:blipFill>
-          <a:blip r:embed="rId2"/>
+          <a:blip r:embed="rId2">
+            <a:extLst>
+              <a:ext uri="{28A0092B-C50C-407E-A947-70E740481C1C}">
+                <a14:useLocalDpi xmlns:a14="http://schemas.microsoft.com/office/drawing/2010/main" val="0"/>
+              </a:ext>
+            </a:extLst>
+          </a:blip>
+          <a:srcRect/>
           <a:stretch>
             <a:fillRect/>
           </a:stretch>
         </p:blipFill>
-        <p:spPr>
-          <a:xfrm>
-            <a:off x="2662377" y="2016125"/>
-            <a:ext cx="7181570" cy="3449638"/>
-          </a:xfrm>
+        <p:spPr bwMode="auto">
+          <a:xfrm>
+            <a:off x="2680123" y="2016125"/>
+            <a:ext cx="7146079" cy="3449638"/>
+          </a:xfrm>
+          <a:prstGeom prst="rect">
+            <a:avLst/>
+          </a:prstGeom>
+          <a:noFill/>
+          <a:extLst>
+            <a:ext uri="{909E8E84-426E-40DD-AFC4-6F175D3DCCD1}">
+              <a14:hiddenFill xmlns:a14="http://schemas.microsoft.com/office/drawing/2010/main">
+                <a:solidFill>
+                  <a:srgbClr val="FFFFFF"/>
+                </a:solidFill>
+              </a14:hiddenFill>
+            </a:ext>
+          </a:extLst>
         </p:spPr>
       </p:pic>
     </p:spTree>

</xml_diff>

<commit_message>
change the sequence of same slides + change the wrong font on some slides
</commit_message>
<xml_diff>
--- a/MyCalendar.pptx
+++ b/MyCalendar.pptx
@@ -13,9 +13,9 @@
     <p:sldId id="260" r:id="rId4"/>
     <p:sldId id="258" r:id="rId5"/>
     <p:sldId id="264" r:id="rId6"/>
-    <p:sldId id="263" r:id="rId7"/>
-    <p:sldId id="266" r:id="rId8"/>
-    <p:sldId id="268" r:id="rId9"/>
+    <p:sldId id="266" r:id="rId7"/>
+    <p:sldId id="268" r:id="rId8"/>
+    <p:sldId id="263" r:id="rId9"/>
     <p:sldId id="257" r:id="rId10"/>
     <p:sldId id="259" r:id="rId11"/>
     <p:sldId id="269" r:id="rId12"/>
@@ -131,6 +131,27 @@
     </p:ext>
   </p:extLst>
 </p:presentation>
+</file>
+
+<file path=ppt/changesInfos/changesInfo1.xml><?xml version="1.0" encoding="utf-8"?>
+<pc:chgInfo xmlns:a="http://schemas.openxmlformats.org/drawingml/2006/main" xmlns:r="http://schemas.openxmlformats.org/officeDocument/2006/relationships" xmlns:ac="http://schemas.microsoft.com/office/drawing/2013/main/command" xmlns:pc="http://schemas.microsoft.com/office/powerpoint/2013/main/command">
+  <pc:docChgLst>
+    <pc:chgData name="Nico Goellmann" userId="c30b9c26-f629-48ad-8226-7a15493c82d9" providerId="ADAL" clId="{EA330B8C-7510-4AF6-9AAA-A9DA8E7F1030}"/>
+    <pc:docChg chg="modSld sldOrd">
+      <pc:chgData name="Nico Goellmann" userId="c30b9c26-f629-48ad-8226-7a15493c82d9" providerId="ADAL" clId="{EA330B8C-7510-4AF6-9AAA-A9DA8E7F1030}" dt="2021-07-19T07:31:07.447" v="1"/>
+      <pc:docMkLst>
+        <pc:docMk/>
+      </pc:docMkLst>
+      <pc:sldChg chg="ord">
+        <pc:chgData name="Nico Goellmann" userId="c30b9c26-f629-48ad-8226-7a15493c82d9" providerId="ADAL" clId="{EA330B8C-7510-4AF6-9AAA-A9DA8E7F1030}" dt="2021-07-19T07:31:07.447" v="1"/>
+        <pc:sldMkLst>
+          <pc:docMk/>
+          <pc:sldMk cId="258373187" sldId="263"/>
+        </pc:sldMkLst>
+      </pc:sldChg>
+    </pc:docChg>
+  </pc:docChgLst>
+</pc:chgInfo>
 </file>
 
 <file path=ppt/notesMasters/notesMaster1.xml><?xml version="1.0" encoding="utf-8"?>
@@ -4411,7 +4432,10 @@
           <a:lstStyle/>
           <a:p>
             <a:r>
-              <a:rPr lang="de-DE" sz="4000" dirty="0"/>
+              <a:rPr lang="de-DE" sz="4000" dirty="0">
+                <a:latin typeface="Arial" panose="020B0604020202020204" pitchFamily="34" charset="0"/>
+                <a:cs typeface="Arial" panose="020B0604020202020204" pitchFamily="34" charset="0"/>
+              </a:rPr>
               <a:t>Teammanagement</a:t>
             </a:r>
           </a:p>
@@ -4446,31 +4470,46 @@
           <a:lstStyle/>
           <a:p>
             <a:r>
-              <a:rPr lang="de-DE" sz="2800" dirty="0"/>
+              <a:rPr lang="de-DE" sz="2800" dirty="0">
+                <a:latin typeface="Arial" panose="020B0604020202020204" pitchFamily="34" charset="0"/>
+                <a:cs typeface="Arial" panose="020B0604020202020204" pitchFamily="34" charset="0"/>
+              </a:rPr>
               <a:t>Projektleiter: Nico</a:t>
             </a:r>
           </a:p>
           <a:p>
             <a:r>
-              <a:rPr lang="de-DE" sz="2800" dirty="0"/>
+              <a:rPr lang="de-DE" sz="2800" dirty="0">
+                <a:latin typeface="Arial" panose="020B0604020202020204" pitchFamily="34" charset="0"/>
+                <a:cs typeface="Arial" panose="020B0604020202020204" pitchFamily="34" charset="0"/>
+              </a:rPr>
               <a:t>Backend:  Yannik (Verantwortlicher), Clemens, Johannes</a:t>
             </a:r>
           </a:p>
           <a:p>
             <a:r>
-              <a:rPr lang="de-DE" sz="2800" dirty="0"/>
+              <a:rPr lang="de-DE" sz="2800" dirty="0">
+                <a:latin typeface="Arial" panose="020B0604020202020204" pitchFamily="34" charset="0"/>
+                <a:cs typeface="Arial" panose="020B0604020202020204" pitchFamily="34" charset="0"/>
+              </a:rPr>
               <a:t>Frontend: Nico (Verantwortlicher), Hanna, Fanny</a:t>
             </a:r>
           </a:p>
           <a:p>
             <a:r>
-              <a:rPr lang="de-DE" sz="2800" dirty="0"/>
+              <a:rPr lang="de-DE" sz="2800" dirty="0">
+                <a:latin typeface="Arial" panose="020B0604020202020204" pitchFamily="34" charset="0"/>
+                <a:cs typeface="Arial" panose="020B0604020202020204" pitchFamily="34" charset="0"/>
+              </a:rPr>
               <a:t>GitHub-Verantwortung: Yannik</a:t>
             </a:r>
           </a:p>
           <a:p>
             <a:r>
-              <a:rPr lang="de-DE" sz="2800" dirty="0"/>
+              <a:rPr lang="de-DE" sz="2800" dirty="0">
+                <a:latin typeface="Arial" panose="020B0604020202020204" pitchFamily="34" charset="0"/>
+                <a:cs typeface="Arial" panose="020B0604020202020204" pitchFamily="34" charset="0"/>
+              </a:rPr>
               <a:t>Qualitätssicherung Verantwortung: Johannes</a:t>
             </a:r>
           </a:p>
@@ -4559,7 +4598,10 @@
           <a:lstStyle/>
           <a:p>
             <a:r>
-              <a:rPr lang="de-DE" sz="4000" dirty="0"/>
+              <a:rPr lang="de-DE" sz="4000" dirty="0">
+                <a:latin typeface="Arial" panose="020B0604020202020204" pitchFamily="34" charset="0"/>
+                <a:cs typeface="Arial" panose="020B0604020202020204" pitchFamily="34" charset="0"/>
+              </a:rPr>
               <a:t>Eingetretene Risiken</a:t>
             </a:r>
           </a:p>
@@ -4589,11 +4631,16 @@
           <a:lstStyle/>
           <a:p>
             <a:r>
-              <a:rPr lang="de-DE" sz="2800" dirty="0"/>
+              <a:rPr lang="de-DE" sz="2800" dirty="0">
+                <a:latin typeface="Arial" panose="020B0604020202020204" pitchFamily="34" charset="0"/>
+                <a:cs typeface="Arial" panose="020B0604020202020204" pitchFamily="34" charset="0"/>
+              </a:rPr>
               <a:t>Mitarbeiterausfälle </a:t>
             </a:r>
             <a:r>
               <a:rPr lang="de-DE" sz="2800" dirty="0">
+                <a:latin typeface="Arial" panose="020B0604020202020204" pitchFamily="34" charset="0"/>
+                <a:cs typeface="Arial" panose="020B0604020202020204" pitchFamily="34" charset="0"/>
                 <a:sym typeface="Wingdings" panose="05000000000000000000" pitchFamily="2" charset="2"/>
               </a:rPr>
               <a:t> bei Aufgabenverteilung berücksichtigt</a:t>
@@ -4602,18 +4649,24 @@
           <a:p>
             <a:r>
               <a:rPr lang="de-DE" sz="2800" dirty="0">
+                <a:latin typeface="Arial" panose="020B0604020202020204" pitchFamily="34" charset="0"/>
+                <a:cs typeface="Arial" panose="020B0604020202020204" pitchFamily="34" charset="0"/>
                 <a:sym typeface="Wingdings" panose="05000000000000000000" pitchFamily="2" charset="2"/>
               </a:rPr>
               <a:t>Kleine </a:t>
             </a:r>
             <a:r>
               <a:rPr lang="de-DE" sz="2800" dirty="0" err="1">
+                <a:latin typeface="Arial" panose="020B0604020202020204" pitchFamily="34" charset="0"/>
+                <a:cs typeface="Arial" panose="020B0604020202020204" pitchFamily="34" charset="0"/>
                 <a:sym typeface="Wingdings" panose="05000000000000000000" pitchFamily="2" charset="2"/>
               </a:rPr>
               <a:t>Mergekonflikte</a:t>
             </a:r>
             <a:r>
               <a:rPr lang="de-DE" sz="2800" dirty="0">
+                <a:latin typeface="Arial" panose="020B0604020202020204" pitchFamily="34" charset="0"/>
+                <a:cs typeface="Arial" panose="020B0604020202020204" pitchFamily="34" charset="0"/>
                 <a:sym typeface="Wingdings" panose="05000000000000000000" pitchFamily="2" charset="2"/>
               </a:rPr>
               <a:t>  durch Code-Review und gute Struktur frühzeitig gelöst</a:t>
@@ -4622,6 +4675,8 @@
           <a:p>
             <a:r>
               <a:rPr lang="de-DE" sz="2800" dirty="0">
+                <a:latin typeface="Arial" panose="020B0604020202020204" pitchFamily="34" charset="0"/>
+                <a:cs typeface="Arial" panose="020B0604020202020204" pitchFamily="34" charset="0"/>
                 <a:sym typeface="Wingdings" panose="05000000000000000000" pitchFamily="2" charset="2"/>
               </a:rPr>
               <a:t>Gutes Wetter  Gegenmaßnahmen unerfolgreich</a:t>
@@ -4630,11 +4685,16 @@
           <a:p>
             <a:r>
               <a:rPr lang="de-DE" sz="2800" dirty="0">
+                <a:latin typeface="Arial" panose="020B0604020202020204" pitchFamily="34" charset="0"/>
+                <a:cs typeface="Arial" panose="020B0604020202020204" pitchFamily="34" charset="0"/>
                 <a:sym typeface="Wingdings" panose="05000000000000000000" pitchFamily="2" charset="2"/>
               </a:rPr>
               <a:t>Kompatibilitätsprobleme von Browsern  frühzeitige Erkennung und Reparatur</a:t>
             </a:r>
-            <a:endParaRPr lang="de-DE" sz="2800" dirty="0"/>
+            <a:endParaRPr lang="de-DE" sz="2800" dirty="0">
+              <a:latin typeface="Arial" panose="020B0604020202020204" pitchFamily="34" charset="0"/>
+              <a:cs typeface="Arial" panose="020B0604020202020204" pitchFamily="34" charset="0"/>
+            </a:endParaRPr>
           </a:p>
         </p:txBody>
       </p:sp>
@@ -4721,7 +4781,10 @@
           <a:lstStyle/>
           <a:p>
             <a:r>
-              <a:rPr lang="de-DE" sz="4000" dirty="0"/>
+              <a:rPr lang="de-DE" sz="4000" dirty="0">
+                <a:latin typeface="Arial" panose="020B0604020202020204" pitchFamily="34" charset="0"/>
+                <a:cs typeface="Arial" panose="020B0604020202020204" pitchFamily="34" charset="0"/>
+              </a:rPr>
               <a:t>Qualitätssicherung</a:t>
             </a:r>
           </a:p>
@@ -4751,35 +4814,52 @@
           <a:lstStyle/>
           <a:p>
             <a:r>
-              <a:rPr lang="de-DE" sz="2800" dirty="0"/>
+              <a:rPr lang="de-DE" sz="2800" dirty="0">
+                <a:latin typeface="Arial" panose="020B0604020202020204" pitchFamily="34" charset="0"/>
+                <a:cs typeface="Arial" panose="020B0604020202020204" pitchFamily="34" charset="0"/>
+              </a:rPr>
               <a:t>Regelmäßige rechtzeitige Code-Reviews und kleinere Funktionsüberprüfungen</a:t>
             </a:r>
           </a:p>
           <a:p>
             <a:r>
-              <a:rPr lang="de-DE" sz="2800" dirty="0"/>
+              <a:rPr lang="de-DE" sz="2800" dirty="0">
+                <a:latin typeface="Arial" panose="020B0604020202020204" pitchFamily="34" charset="0"/>
+                <a:cs typeface="Arial" panose="020B0604020202020204" pitchFamily="34" charset="0"/>
+              </a:rPr>
               <a:t>GitHub-Hierarchie überwiegend sauber getrennt</a:t>
             </a:r>
           </a:p>
           <a:p>
             <a:r>
-              <a:rPr lang="de-DE" sz="2800" dirty="0"/>
+              <a:rPr lang="de-DE" sz="2800" dirty="0">
+                <a:latin typeface="Arial" panose="020B0604020202020204" pitchFamily="34" charset="0"/>
+                <a:cs typeface="Arial" panose="020B0604020202020204" pitchFamily="34" charset="0"/>
+              </a:rPr>
               <a:t>Regelmäßige und außerplanmäßige Meetings nach Bedarf</a:t>
             </a:r>
           </a:p>
           <a:p>
             <a:r>
-              <a:rPr lang="de-DE" sz="2800" dirty="0"/>
+              <a:rPr lang="de-DE" sz="2800" dirty="0">
+                <a:latin typeface="Arial" panose="020B0604020202020204" pitchFamily="34" charset="0"/>
+                <a:cs typeface="Arial" panose="020B0604020202020204" pitchFamily="34" charset="0"/>
+              </a:rPr>
               <a:t>4-Eyes-Coding und 6-Eyes-Coding </a:t>
             </a:r>
             <a:r>
               <a:rPr lang="de-DE" sz="2800" dirty="0">
+                <a:latin typeface="Arial" panose="020B0604020202020204" pitchFamily="34" charset="0"/>
+                <a:cs typeface="Arial" panose="020B0604020202020204" pitchFamily="34" charset="0"/>
                 <a:sym typeface="Wingdings" panose="05000000000000000000" pitchFamily="2" charset="2"/>
               </a:rPr>
               <a:t></a:t>
             </a:r>
             <a:r>
-              <a:rPr lang="de-DE" sz="2800" dirty="0"/>
+              <a:rPr lang="de-DE" sz="2800" dirty="0">
+                <a:latin typeface="Arial" panose="020B0604020202020204" pitchFamily="34" charset="0"/>
+                <a:cs typeface="Arial" panose="020B0604020202020204" pitchFamily="34" charset="0"/>
+              </a:rPr>
               <a:t> erhöhte Arbeitseffizienz und frühzeitiges Erkennen von Fehlern</a:t>
             </a:r>
           </a:p>
@@ -4868,7 +4948,10 @@
           <a:lstStyle/>
           <a:p>
             <a:r>
-              <a:rPr lang="de-DE" sz="4000" dirty="0"/>
+              <a:rPr lang="de-DE" sz="4000" dirty="0">
+                <a:latin typeface="Arial" panose="020B0604020202020204" pitchFamily="34" charset="0"/>
+                <a:cs typeface="Arial" panose="020B0604020202020204" pitchFamily="34" charset="0"/>
+              </a:rPr>
               <a:t>Code Reviews - OVERVIEW</a:t>
             </a:r>
           </a:p>
@@ -4898,35 +4981,50 @@
           <a:lstStyle/>
           <a:p>
             <a:r>
-              <a:rPr lang="de-DE" sz="2800" dirty="0"/>
+              <a:rPr lang="de-DE" sz="2800" dirty="0">
+                <a:latin typeface="Arial" panose="020B0604020202020204" pitchFamily="34" charset="0"/>
+                <a:cs typeface="Arial" panose="020B0604020202020204" pitchFamily="34" charset="0"/>
+              </a:rPr>
               <a:t>4 Code Reviews:</a:t>
             </a:r>
           </a:p>
           <a:p>
             <a:pPr lvl="1"/>
             <a:r>
-              <a:rPr lang="de-DE" sz="2800" dirty="0"/>
+              <a:rPr lang="de-DE" sz="2800" dirty="0">
+                <a:latin typeface="Arial" panose="020B0604020202020204" pitchFamily="34" charset="0"/>
+                <a:cs typeface="Arial" panose="020B0604020202020204" pitchFamily="34" charset="0"/>
+              </a:rPr>
               <a:t>HTML-Grundgerüst / Prototyp</a:t>
             </a:r>
           </a:p>
           <a:p>
             <a:pPr lvl="1"/>
             <a:r>
-              <a:rPr lang="de-DE" sz="2800" dirty="0"/>
+              <a:rPr lang="de-DE" sz="2800" dirty="0">
+                <a:latin typeface="Arial" panose="020B0604020202020204" pitchFamily="34" charset="0"/>
+                <a:cs typeface="Arial" panose="020B0604020202020204" pitchFamily="34" charset="0"/>
+              </a:rPr>
               <a:t>Backend-Funktionalität</a:t>
             </a:r>
           </a:p>
           <a:p>
             <a:pPr lvl="1"/>
             <a:r>
-              <a:rPr lang="de-DE" sz="2800" dirty="0"/>
+              <a:rPr lang="de-DE" sz="2800" dirty="0">
+                <a:latin typeface="Arial" panose="020B0604020202020204" pitchFamily="34" charset="0"/>
+                <a:cs typeface="Arial" panose="020B0604020202020204" pitchFamily="34" charset="0"/>
+              </a:rPr>
               <a:t>Frontend und Design</a:t>
             </a:r>
           </a:p>
           <a:p>
             <a:pPr lvl="1"/>
             <a:r>
-              <a:rPr lang="de-DE" sz="2800" dirty="0"/>
+              <a:rPr lang="de-DE" sz="2800" dirty="0">
+                <a:latin typeface="Arial" panose="020B0604020202020204" pitchFamily="34" charset="0"/>
+                <a:cs typeface="Arial" panose="020B0604020202020204" pitchFamily="34" charset="0"/>
+              </a:rPr>
               <a:t>Abschließende Gesamtbetrachtung</a:t>
             </a:r>
           </a:p>
@@ -4934,11 +5032,17 @@
             <a:pPr marL="0" indent="0">
               <a:buNone/>
             </a:pPr>
-            <a:endParaRPr lang="de-DE" sz="2800" dirty="0"/>
+            <a:endParaRPr lang="de-DE" sz="2800" dirty="0">
+              <a:latin typeface="Arial" panose="020B0604020202020204" pitchFamily="34" charset="0"/>
+              <a:cs typeface="Arial" panose="020B0604020202020204" pitchFamily="34" charset="0"/>
+            </a:endParaRPr>
           </a:p>
           <a:p>
             <a:pPr lvl="1"/>
-            <a:endParaRPr lang="de-DE" sz="2800" dirty="0"/>
+            <a:endParaRPr lang="de-DE" sz="2800" dirty="0">
+              <a:latin typeface="Arial" panose="020B0604020202020204" pitchFamily="34" charset="0"/>
+              <a:cs typeface="Arial" panose="020B0604020202020204" pitchFamily="34" charset="0"/>
+            </a:endParaRPr>
           </a:p>
         </p:txBody>
       </p:sp>
@@ -5025,7 +5129,10 @@
           <a:lstStyle/>
           <a:p>
             <a:r>
-              <a:rPr lang="de-DE" sz="4000" dirty="0"/>
+              <a:rPr lang="de-DE" sz="4000" dirty="0">
+                <a:latin typeface="Arial" panose="020B0604020202020204" pitchFamily="34" charset="0"/>
+                <a:cs typeface="Arial" panose="020B0604020202020204" pitchFamily="34" charset="0"/>
+              </a:rPr>
               <a:t>Code Reviews – Main Points</a:t>
             </a:r>
           </a:p>
@@ -5055,33 +5162,51 @@
           <a:lstStyle/>
           <a:p>
             <a:r>
-              <a:rPr lang="de-DE" sz="2800" dirty="0"/>
+              <a:rPr lang="de-DE" sz="2800" dirty="0">
+                <a:latin typeface="Arial" panose="020B0604020202020204" pitchFamily="34" charset="0"/>
+                <a:cs typeface="Arial" panose="020B0604020202020204" pitchFamily="34" charset="0"/>
+              </a:rPr>
               <a:t>Einzelne Logikfehler in Berechnungen und Funktionen</a:t>
             </a:r>
           </a:p>
           <a:p>
             <a:r>
-              <a:rPr lang="de-DE" sz="2800" dirty="0"/>
+              <a:rPr lang="de-DE" sz="2800" dirty="0">
+                <a:latin typeface="Arial" panose="020B0604020202020204" pitchFamily="34" charset="0"/>
+                <a:cs typeface="Arial" panose="020B0604020202020204" pitchFamily="34" charset="0"/>
+              </a:rPr>
               <a:t>XML-Konformität</a:t>
             </a:r>
           </a:p>
           <a:p>
             <a:r>
-              <a:rPr lang="de-DE" sz="2800" dirty="0"/>
+              <a:rPr lang="de-DE" sz="2800" dirty="0">
+                <a:latin typeface="Arial" panose="020B0604020202020204" pitchFamily="34" charset="0"/>
+                <a:cs typeface="Arial" panose="020B0604020202020204" pitchFamily="34" charset="0"/>
+              </a:rPr>
               <a:t>Bezeichnung von Elementen (IDs, Klassen, Variablen, …) </a:t>
             </a:r>
           </a:p>
           <a:p>
             <a:r>
-              <a:rPr lang="de-DE" sz="2800" dirty="0"/>
+              <a:rPr lang="de-DE" sz="2800" dirty="0">
+                <a:latin typeface="Arial" panose="020B0604020202020204" pitchFamily="34" charset="0"/>
+                <a:cs typeface="Arial" panose="020B0604020202020204" pitchFamily="34" charset="0"/>
+              </a:rPr>
               <a:t>Codeformatierung + mangelnde Dokumentation</a:t>
             </a:r>
           </a:p>
           <a:p>
-            <a:endParaRPr lang="de-DE" sz="2800" dirty="0"/>
-          </a:p>
-          <a:p>
-            <a:endParaRPr lang="de-DE" sz="2800" dirty="0"/>
+            <a:endParaRPr lang="de-DE" sz="2800" dirty="0">
+              <a:latin typeface="Arial" panose="020B0604020202020204" pitchFamily="34" charset="0"/>
+              <a:cs typeface="Arial" panose="020B0604020202020204" pitchFamily="34" charset="0"/>
+            </a:endParaRPr>
+          </a:p>
+          <a:p>
+            <a:endParaRPr lang="de-DE" sz="2800" dirty="0">
+              <a:latin typeface="Arial" panose="020B0604020202020204" pitchFamily="34" charset="0"/>
+              <a:cs typeface="Arial" panose="020B0604020202020204" pitchFamily="34" charset="0"/>
+            </a:endParaRPr>
           </a:p>
         </p:txBody>
       </p:sp>
@@ -5168,7 +5293,10 @@
           <a:lstStyle/>
           <a:p>
             <a:r>
-              <a:rPr lang="de-DE" sz="4000" dirty="0"/>
+              <a:rPr lang="de-DE" sz="4000" dirty="0">
+                <a:latin typeface="Arial" panose="020B0604020202020204" pitchFamily="34" charset="0"/>
+                <a:cs typeface="Arial" panose="020B0604020202020204" pitchFamily="34" charset="0"/>
+              </a:rPr>
               <a:t>Terminplanung</a:t>
             </a:r>
           </a:p>
@@ -5198,36 +5326,54 @@
           <a:lstStyle/>
           <a:p>
             <a:r>
-              <a:rPr lang="de-DE" sz="2800" dirty="0"/>
+              <a:rPr lang="de-DE" sz="2800" dirty="0">
+                <a:latin typeface="Arial" panose="020B0604020202020204" pitchFamily="34" charset="0"/>
+                <a:cs typeface="Arial" panose="020B0604020202020204" pitchFamily="34" charset="0"/>
+              </a:rPr>
               <a:t>Zu Beginn sehr pünktlich (1. Code-Review,  Prototyp)</a:t>
             </a:r>
           </a:p>
           <a:p>
             <a:r>
-              <a:rPr lang="de-DE" sz="2800" dirty="0"/>
+              <a:rPr lang="de-DE" sz="2800" dirty="0">
+                <a:latin typeface="Arial" panose="020B0604020202020204" pitchFamily="34" charset="0"/>
+                <a:cs typeface="Arial" panose="020B0604020202020204" pitchFamily="34" charset="0"/>
+              </a:rPr>
               <a:t>Minimale Abweichungen im Terminplan (1-2 Tage für 2. und 3. Code-Review)</a:t>
             </a:r>
           </a:p>
           <a:p>
             <a:r>
-              <a:rPr lang="de-DE" sz="2800" dirty="0"/>
+              <a:rPr lang="de-DE" sz="2800" dirty="0">
+                <a:latin typeface="Arial" panose="020B0604020202020204" pitchFamily="34" charset="0"/>
+                <a:cs typeface="Arial" panose="020B0604020202020204" pitchFamily="34" charset="0"/>
+              </a:rPr>
               <a:t>Letztes Code-Review 5 Tage verspätet</a:t>
             </a:r>
           </a:p>
           <a:p>
             <a:r>
-              <a:rPr lang="de-DE" sz="2800" dirty="0"/>
+              <a:rPr lang="de-DE" sz="2800" dirty="0">
+                <a:latin typeface="Arial" panose="020B0604020202020204" pitchFamily="34" charset="0"/>
+                <a:cs typeface="Arial" panose="020B0604020202020204" pitchFamily="34" charset="0"/>
+              </a:rPr>
               <a:t>Maßnahme: 1 Woche Pufferzeit eingeplant</a:t>
             </a:r>
           </a:p>
           <a:p>
             <a:r>
-              <a:rPr lang="de-DE" sz="2800" dirty="0"/>
+              <a:rPr lang="de-DE" sz="2800" dirty="0">
+                <a:latin typeface="Arial" panose="020B0604020202020204" pitchFamily="34" charset="0"/>
+                <a:cs typeface="Arial" panose="020B0604020202020204" pitchFamily="34" charset="0"/>
+              </a:rPr>
               <a:t>Fazit: pünktlicher Projektabschluss möglich</a:t>
             </a:r>
           </a:p>
           <a:p>
-            <a:endParaRPr lang="de-DE" dirty="0"/>
+            <a:endParaRPr lang="de-DE" dirty="0">
+              <a:latin typeface="Arial" panose="020B0604020202020204" pitchFamily="34" charset="0"/>
+              <a:cs typeface="Arial" panose="020B0604020202020204" pitchFamily="34" charset="0"/>
+            </a:endParaRPr>
           </a:p>
         </p:txBody>
       </p:sp>
@@ -5312,34 +5458,16 @@
           <a:lstStyle/>
           <a:p>
             <a:r>
+              <a:rPr lang="de-DE" dirty="0">
+                <a:latin typeface="Arial" panose="020B0604020202020204" pitchFamily="34" charset="0"/>
+                <a:cs typeface="Arial" panose="020B0604020202020204" pitchFamily="34" charset="0"/>
+              </a:rPr>
+              <a:t>STIMMUNG</a:t>
+            </a:r>
+            <a:r>
               <a:rPr lang="de-DE" dirty="0"/>
-              <a:t>STIMMUNG IM TEAM</a:t>
-            </a:r>
-          </a:p>
-        </p:txBody>
-      </p:sp>
-      <p:sp>
-        <p:nvSpPr>
-          <p:cNvPr id="3" name="Content Placeholder 2">
-            <a:extLst>
-              <a:ext uri="{FF2B5EF4-FFF2-40B4-BE49-F238E27FC236}">
-                <a16:creationId xmlns:a16="http://schemas.microsoft.com/office/drawing/2014/main" id="{CBE3BC58-775C-437B-8C91-518571DF7B8E}"/>
-              </a:ext>
-            </a:extLst>
-          </p:cNvPr>
-          <p:cNvSpPr>
-            <a:spLocks noGrp="1"/>
-          </p:cNvSpPr>
-          <p:nvPr>
-            <p:ph idx="1"/>
-          </p:nvPr>
-        </p:nvSpPr>
-        <p:spPr/>
-        <p:txBody>
-          <a:bodyPr/>
-          <a:lstStyle/>
-          <a:p>
-            <a:endParaRPr lang="de-DE" dirty="0"/>
+              <a:t> IM TEAM</a:t>
+            </a:r>
           </a:p>
         </p:txBody>
       </p:sp>
@@ -5764,6 +5892,30 @@
 <file path=ppt/slides/slide2.xml><?xml version="1.0" encoding="utf-8"?>
 <p:sld xmlns:a="http://schemas.openxmlformats.org/drawingml/2006/main" xmlns:r="http://schemas.openxmlformats.org/officeDocument/2006/relationships" xmlns:p="http://schemas.openxmlformats.org/presentationml/2006/main">
   <p:cSld>
+    <p:bg>
+      <p:bgPr>
+        <a:gradFill rotWithShape="1">
+          <a:gsLst>
+            <a:gs pos="0">
+              <a:schemeClr val="bg2">
+                <a:tint val="94000"/>
+                <a:satMod val="80000"/>
+                <a:lumMod val="106000"/>
+              </a:schemeClr>
+            </a:gs>
+            <a:gs pos="100000">
+              <a:schemeClr val="bg2">
+                <a:shade val="80000"/>
+              </a:schemeClr>
+            </a:gs>
+          </a:gsLst>
+          <a:path path="circle">
+            <a:fillToRect l="43000" r="43000" b="100000"/>
+          </a:path>
+        </a:gradFill>
+        <a:effectLst/>
+      </p:bgPr>
+    </p:bg>
     <p:spTree>
       <p:nvGrpSpPr>
         <p:cNvPr id="1" name=""/>
@@ -5778,116 +5930,63 @@
           <a:chExt cx="0" cy="0"/>
         </a:xfrm>
       </p:grpSpPr>
-      <p:sp>
-        <p:nvSpPr>
-          <p:cNvPr id="2" name="Titel 1">
+      <p:sp useBgFill="1">
+        <p:nvSpPr>
+          <p:cNvPr id="1059" name="Rectangle 70">
             <a:extLst>
               <a:ext uri="{FF2B5EF4-FFF2-40B4-BE49-F238E27FC236}">
-                <a16:creationId xmlns:a16="http://schemas.microsoft.com/office/drawing/2014/main" id="{36834D4F-0806-4391-BE96-96CBE09425CD}"/>
+                <a16:creationId xmlns:a16="http://schemas.microsoft.com/office/drawing/2014/main" id="{8D095B41-7312-4603-9F0F-93387C353134}"/>
+              </a:ext>
+              <a:ext uri="{C183D7F6-B498-43B3-948B-1728B52AA6E4}">
+                <adec:decorative xmlns:adec="http://schemas.microsoft.com/office/drawing/2017/decorative" val="1"/>
               </a:ext>
             </a:extLst>
           </p:cNvPr>
           <p:cNvSpPr>
-            <a:spLocks noGrp="1"/>
-          </p:cNvSpPr>
-          <p:nvPr>
-            <p:ph type="ctrTitle"/>
+            <a:spLocks noGrp="1" noRot="1" noChangeAspect="1" noMove="1" noResize="1" noEditPoints="1" noAdjustHandles="1" noChangeArrowheads="1" noChangeShapeType="1" noTextEdit="1"/>
+          </p:cNvSpPr>
+          <p:nvPr>
+            <p:extLst>
+              <p:ext uri="{386F3935-93C4-4BCD-93E2-E3B085C9AB24}">
+                <p16:designElem xmlns:p16="http://schemas.microsoft.com/office/powerpoint/2015/main" val="1"/>
+              </p:ext>
+            </p:extLst>
           </p:nvPr>
         </p:nvSpPr>
         <p:spPr>
           <a:xfrm>
-            <a:off x="1705666" y="4394495"/>
-            <a:ext cx="8637073" cy="558063"/>
-          </a:xfrm>
-        </p:spPr>
-        <p:txBody>
-          <a:bodyPr>
-            <a:noAutofit/>
-          </a:bodyPr>
-          <a:lstStyle/>
-          <a:p>
-            <a:r>
-              <a:rPr lang="de-DE" sz="4000" b="1" u="sng" dirty="0" err="1">
-                <a:latin typeface="Arial" panose="020B0604020202020204" pitchFamily="34" charset="0"/>
-                <a:cs typeface="Arial" panose="020B0604020202020204" pitchFamily="34" charset="0"/>
-              </a:rPr>
-              <a:t>My</a:t>
-            </a:r>
-            <a:r>
-              <a:rPr lang="de-DE" sz="4000" b="1" u="sng" dirty="0">
-                <a:latin typeface="Arial" panose="020B0604020202020204" pitchFamily="34" charset="0"/>
-                <a:cs typeface="Arial" panose="020B0604020202020204" pitchFamily="34" charset="0"/>
-              </a:rPr>
-              <a:t> </a:t>
-            </a:r>
-            <a:r>
-              <a:rPr lang="de-DE" sz="4000" b="1" u="sng" dirty="0" err="1">
-                <a:latin typeface="Arial" panose="020B0604020202020204" pitchFamily="34" charset="0"/>
-                <a:cs typeface="Arial" panose="020B0604020202020204" pitchFamily="34" charset="0"/>
-              </a:rPr>
-              <a:t>Calendar</a:t>
-            </a:r>
-            <a:endParaRPr lang="de-DE" sz="4000" b="1" u="sng" dirty="0">
-              <a:latin typeface="Arial" panose="020B0604020202020204" pitchFamily="34" charset="0"/>
-              <a:cs typeface="Arial" panose="020B0604020202020204" pitchFamily="34" charset="0"/>
-            </a:endParaRPr>
-          </a:p>
-        </p:txBody>
-      </p:sp>
-      <p:sp>
-        <p:nvSpPr>
-          <p:cNvPr id="3" name="Untertitel 2">
-            <a:extLst>
-              <a:ext uri="{FF2B5EF4-FFF2-40B4-BE49-F238E27FC236}">
-                <a16:creationId xmlns:a16="http://schemas.microsoft.com/office/drawing/2014/main" id="{F14394D2-E5F6-4779-9B43-B2C715285D2D}"/>
-              </a:ext>
-            </a:extLst>
-          </p:cNvPr>
-          <p:cNvSpPr>
-            <a:spLocks noGrp="1"/>
-          </p:cNvSpPr>
-          <p:nvPr>
-            <p:ph type="subTitle" idx="1"/>
-          </p:nvPr>
-        </p:nvSpPr>
-        <p:spPr>
-          <a:xfrm>
-            <a:off x="1705666" y="5032997"/>
-            <a:ext cx="9278019" cy="1104246"/>
-          </a:xfrm>
-        </p:spPr>
-        <p:txBody>
-          <a:bodyPr>
-            <a:noAutofit/>
-          </a:bodyPr>
-          <a:lstStyle/>
-          <a:p>
-            <a:pPr>
-              <a:lnSpc>
-                <a:spcPct val="110000"/>
-              </a:lnSpc>
-            </a:pPr>
-            <a:r>
-              <a:rPr lang="de-DE" sz="2800" dirty="0">
-                <a:latin typeface="Arial" panose="020B0604020202020204" pitchFamily="34" charset="0"/>
-                <a:cs typeface="Arial" panose="020B0604020202020204" pitchFamily="34" charset="0"/>
-              </a:rPr>
-              <a:t>Der </a:t>
-            </a:r>
-            <a:r>
-              <a:rPr lang="de-DE" sz="2800" dirty="0" err="1">
-                <a:latin typeface="Arial" panose="020B0604020202020204" pitchFamily="34" charset="0"/>
-                <a:cs typeface="Arial" panose="020B0604020202020204" pitchFamily="34" charset="0"/>
-              </a:rPr>
-              <a:t>GeburtstagsKalender</a:t>
-            </a:r>
-            <a:r>
-              <a:rPr lang="de-DE" sz="2800" dirty="0">
-                <a:latin typeface="Arial" panose="020B0604020202020204" pitchFamily="34" charset="0"/>
-                <a:cs typeface="Arial" panose="020B0604020202020204" pitchFamily="34" charset="0"/>
-              </a:rPr>
-              <a:t> für Jedermann!</a:t>
-            </a:r>
+            <a:off x="2" y="0"/>
+            <a:ext cx="12191695" cy="6858000"/>
+          </a:xfrm>
+          <a:prstGeom prst="rect">
+            <a:avLst/>
+          </a:prstGeom>
+          <a:ln>
+            <a:noFill/>
+          </a:ln>
+        </p:spPr>
+        <p:style>
+          <a:lnRef idx="2">
+            <a:schemeClr val="accent1">
+              <a:shade val="50000"/>
+            </a:schemeClr>
+          </a:lnRef>
+          <a:fillRef idx="1">
+            <a:schemeClr val="accent1"/>
+          </a:fillRef>
+          <a:effectRef idx="0">
+            <a:schemeClr val="accent1"/>
+          </a:effectRef>
+          <a:fontRef idx="minor">
+            <a:schemeClr val="lt1"/>
+          </a:fontRef>
+        </p:style>
+        <p:txBody>
+          <a:bodyPr rtlCol="0" anchor="ctr"/>
+          <a:lstStyle/>
+          <a:p>
+            <a:pPr algn="ctr"/>
+            <a:endParaRPr lang="en-US"/>
           </a:p>
         </p:txBody>
       </p:sp>
@@ -5906,20 +6005,359 @@
           <p:nvPr/>
         </p:nvPicPr>
         <p:blipFill rotWithShape="1">
-          <a:blip r:embed="rId2"/>
-          <a:srcRect t="5281" r="-1" b="13138"/>
+          <a:blip r:embed="rId2">
+            <a:duotone>
+              <a:schemeClr val="bg2">
+                <a:shade val="45000"/>
+                <a:satMod val="135000"/>
+              </a:schemeClr>
+              <a:prstClr val="white"/>
+            </a:duotone>
+            <a:alphaModFix amt="50000"/>
+          </a:blip>
+          <a:srcRect t="3618" r="-1" b="11474"/>
           <a:stretch/>
         </p:blipFill>
         <p:spPr>
           <a:xfrm>
-            <a:off x="2576265" y="351131"/>
-            <a:ext cx="7039469" cy="3804612"/>
+            <a:off x="305" y="10"/>
+            <a:ext cx="12191695" cy="6857990"/>
           </a:xfrm>
           <a:prstGeom prst="rect">
             <a:avLst/>
           </a:prstGeom>
         </p:spPr>
       </p:pic>
+      <p:sp>
+        <p:nvSpPr>
+          <p:cNvPr id="1060" name="Rectangle 72">
+            <a:extLst>
+              <a:ext uri="{FF2B5EF4-FFF2-40B4-BE49-F238E27FC236}">
+                <a16:creationId xmlns:a16="http://schemas.microsoft.com/office/drawing/2014/main" id="{1042C936-444C-4F0D-9737-291EAFE1E7E4}"/>
+              </a:ext>
+              <a:ext uri="{C183D7F6-B498-43B3-948B-1728B52AA6E4}">
+                <adec:decorative xmlns:adec="http://schemas.microsoft.com/office/drawing/2017/decorative" val="1"/>
+              </a:ext>
+            </a:extLst>
+          </p:cNvPr>
+          <p:cNvSpPr>
+            <a:spLocks noGrp="1" noRot="1" noChangeAspect="1" noMove="1" noResize="1" noEditPoints="1" noAdjustHandles="1" noChangeArrowheads="1" noChangeShapeType="1" noTextEdit="1"/>
+          </p:cNvSpPr>
+          <p:nvPr>
+            <p:extLst>
+              <p:ext uri="{386F3935-93C4-4BCD-93E2-E3B085C9AB24}">
+                <p16:designElem xmlns:p16="http://schemas.microsoft.com/office/powerpoint/2015/main" val="1"/>
+              </p:ext>
+            </p:extLst>
+          </p:nvPr>
+        </p:nvSpPr>
+        <p:spPr>
+          <a:xfrm>
+            <a:off x="0" y="2019476"/>
+            <a:ext cx="12192000" cy="4105941"/>
+          </a:xfrm>
+          <a:prstGeom prst="rect">
+            <a:avLst/>
+          </a:prstGeom>
+          <a:gradFill flip="none" rotWithShape="1">
+            <a:gsLst>
+              <a:gs pos="0">
+                <a:schemeClr val="bg2">
+                  <a:alpha val="0"/>
+                </a:schemeClr>
+              </a:gs>
+              <a:gs pos="100000">
+                <a:schemeClr val="bg2">
+                  <a:alpha val="80000"/>
+                </a:schemeClr>
+              </a:gs>
+            </a:gsLst>
+            <a:lin ang="5400000" scaled="0"/>
+            <a:tileRect/>
+          </a:gradFill>
+          <a:ln>
+            <a:noFill/>
+          </a:ln>
+        </p:spPr>
+        <p:style>
+          <a:lnRef idx="2">
+            <a:schemeClr val="accent1">
+              <a:shade val="50000"/>
+            </a:schemeClr>
+          </a:lnRef>
+          <a:fillRef idx="1">
+            <a:schemeClr val="accent1"/>
+          </a:fillRef>
+          <a:effectRef idx="0">
+            <a:schemeClr val="accent1"/>
+          </a:effectRef>
+          <a:fontRef idx="minor">
+            <a:schemeClr val="lt1"/>
+          </a:fontRef>
+        </p:style>
+        <p:txBody>
+          <a:bodyPr rtlCol="0" anchor="ctr"/>
+          <a:lstStyle/>
+          <a:p>
+            <a:pPr algn="ctr"/>
+            <a:endParaRPr lang="en-US"/>
+          </a:p>
+        </p:txBody>
+      </p:sp>
+      <p:sp>
+        <p:nvSpPr>
+          <p:cNvPr id="2" name="Titel 1">
+            <a:extLst>
+              <a:ext uri="{FF2B5EF4-FFF2-40B4-BE49-F238E27FC236}">
+                <a16:creationId xmlns:a16="http://schemas.microsoft.com/office/drawing/2014/main" id="{36834D4F-0806-4391-BE96-96CBE09425CD}"/>
+              </a:ext>
+            </a:extLst>
+          </p:cNvPr>
+          <p:cNvSpPr>
+            <a:spLocks noGrp="1"/>
+          </p:cNvSpPr>
+          <p:nvPr>
+            <p:ph type="ctrTitle"/>
+          </p:nvPr>
+        </p:nvSpPr>
+        <p:spPr>
+          <a:xfrm>
+            <a:off x="2417779" y="802298"/>
+            <a:ext cx="8637073" cy="2541431"/>
+          </a:xfrm>
+        </p:spPr>
+        <p:txBody>
+          <a:bodyPr>
+            <a:normAutofit/>
+          </a:bodyPr>
+          <a:lstStyle/>
+          <a:p>
+            <a:r>
+              <a:rPr lang="de-DE" b="1" u="sng" dirty="0" err="1">
+                <a:latin typeface="Arial" panose="020B0604020202020204" pitchFamily="34" charset="0"/>
+                <a:cs typeface="Arial" panose="020B0604020202020204" pitchFamily="34" charset="0"/>
+              </a:rPr>
+              <a:t>My</a:t>
+            </a:r>
+            <a:r>
+              <a:rPr lang="de-DE" b="1" u="sng" dirty="0">
+                <a:latin typeface="Arial" panose="020B0604020202020204" pitchFamily="34" charset="0"/>
+                <a:cs typeface="Arial" panose="020B0604020202020204" pitchFamily="34" charset="0"/>
+              </a:rPr>
+              <a:t> </a:t>
+            </a:r>
+            <a:r>
+              <a:rPr lang="de-DE" b="1" u="sng" dirty="0" err="1">
+                <a:latin typeface="Arial" panose="020B0604020202020204" pitchFamily="34" charset="0"/>
+                <a:cs typeface="Arial" panose="020B0604020202020204" pitchFamily="34" charset="0"/>
+              </a:rPr>
+              <a:t>Calendar</a:t>
+            </a:r>
+            <a:endParaRPr lang="de-DE" b="1" u="sng" dirty="0">
+              <a:latin typeface="Arial" panose="020B0604020202020204" pitchFamily="34" charset="0"/>
+              <a:cs typeface="Arial" panose="020B0604020202020204" pitchFamily="34" charset="0"/>
+            </a:endParaRPr>
+          </a:p>
+        </p:txBody>
+      </p:sp>
+      <p:sp>
+        <p:nvSpPr>
+          <p:cNvPr id="3" name="Untertitel 2">
+            <a:extLst>
+              <a:ext uri="{FF2B5EF4-FFF2-40B4-BE49-F238E27FC236}">
+                <a16:creationId xmlns:a16="http://schemas.microsoft.com/office/drawing/2014/main" id="{F14394D2-E5F6-4779-9B43-B2C715285D2D}"/>
+              </a:ext>
+            </a:extLst>
+          </p:cNvPr>
+          <p:cNvSpPr>
+            <a:spLocks noGrp="1"/>
+          </p:cNvSpPr>
+          <p:nvPr>
+            <p:ph type="subTitle" idx="1"/>
+          </p:nvPr>
+        </p:nvSpPr>
+        <p:spPr>
+          <a:xfrm>
+            <a:off x="2308595" y="3531204"/>
+            <a:ext cx="8930333" cy="977621"/>
+          </a:xfrm>
+        </p:spPr>
+        <p:txBody>
+          <a:bodyPr>
+            <a:noAutofit/>
+          </a:bodyPr>
+          <a:lstStyle/>
+          <a:p>
+            <a:r>
+              <a:rPr lang="de-DE" sz="2800" dirty="0">
+                <a:latin typeface="Arial" panose="020B0604020202020204" pitchFamily="34" charset="0"/>
+                <a:cs typeface="Arial" panose="020B0604020202020204" pitchFamily="34" charset="0"/>
+              </a:rPr>
+              <a:t>Der </a:t>
+            </a:r>
+            <a:r>
+              <a:rPr lang="de-DE" sz="2800" dirty="0" err="1">
+                <a:latin typeface="Arial" panose="020B0604020202020204" pitchFamily="34" charset="0"/>
+                <a:cs typeface="Arial" panose="020B0604020202020204" pitchFamily="34" charset="0"/>
+              </a:rPr>
+              <a:t>GeburtstagsKalender</a:t>
+            </a:r>
+            <a:r>
+              <a:rPr lang="de-DE" sz="2800" dirty="0">
+                <a:latin typeface="Arial" panose="020B0604020202020204" pitchFamily="34" charset="0"/>
+                <a:cs typeface="Arial" panose="020B0604020202020204" pitchFamily="34" charset="0"/>
+              </a:rPr>
+              <a:t> für Jedermann!</a:t>
+            </a:r>
+          </a:p>
+        </p:txBody>
+      </p:sp>
+      <p:cxnSp>
+        <p:nvCxnSpPr>
+          <p:cNvPr id="1061" name="Straight Connector 74">
+            <a:extLst>
+              <a:ext uri="{FF2B5EF4-FFF2-40B4-BE49-F238E27FC236}">
+                <a16:creationId xmlns:a16="http://schemas.microsoft.com/office/drawing/2014/main" id="{B61C4D9F-F4AF-4ED2-9310-56EB2E19C084}"/>
+              </a:ext>
+              <a:ext uri="{C183D7F6-B498-43B3-948B-1728B52AA6E4}">
+                <adec:decorative xmlns:adec="http://schemas.microsoft.com/office/drawing/2017/decorative" val="1"/>
+              </a:ext>
+            </a:extLst>
+          </p:cNvPr>
+          <p:cNvCxnSpPr>
+            <a:cxnSpLocks noGrp="1" noRot="1" noChangeAspect="1" noMove="1" noResize="1" noEditPoints="1" noAdjustHandles="1" noChangeArrowheads="1" noChangeShapeType="1"/>
+          </p:cNvCxnSpPr>
+          <p:nvPr>
+            <p:extLst>
+              <p:ext uri="{386F3935-93C4-4BCD-93E2-E3B085C9AB24}">
+                <p16:designElem xmlns:p16="http://schemas.microsoft.com/office/powerpoint/2015/main" val="1"/>
+              </p:ext>
+            </p:extLst>
+          </p:nvPr>
+        </p:nvCxnSpPr>
+        <p:spPr>
+          <a:xfrm>
+            <a:off x="2417780" y="3528543"/>
+            <a:ext cx="8637072" cy="0"/>
+          </a:xfrm>
+          <a:prstGeom prst="line">
+            <a:avLst/>
+          </a:prstGeom>
+          <a:ln w="31750"/>
+        </p:spPr>
+        <p:style>
+          <a:lnRef idx="3">
+            <a:schemeClr val="accent1"/>
+          </a:lnRef>
+          <a:fillRef idx="0">
+            <a:schemeClr val="accent1"/>
+          </a:fillRef>
+          <a:effectRef idx="2">
+            <a:schemeClr val="accent1"/>
+          </a:effectRef>
+          <a:fontRef idx="minor">
+            <a:schemeClr val="tx1"/>
+          </a:fontRef>
+        </p:style>
+      </p:cxnSp>
+      <p:pic>
+        <p:nvPicPr>
+          <p:cNvPr id="1062" name="Picture 76">
+            <a:extLst>
+              <a:ext uri="{FF2B5EF4-FFF2-40B4-BE49-F238E27FC236}">
+                <a16:creationId xmlns:a16="http://schemas.microsoft.com/office/drawing/2014/main" id="{419FDB25-3050-4009-9806-3000DDD1C083}"/>
+              </a:ext>
+              <a:ext uri="{C183D7F6-B498-43B3-948B-1728B52AA6E4}">
+                <adec:decorative xmlns:adec="http://schemas.microsoft.com/office/drawing/2017/decorative" val="1"/>
+              </a:ext>
+            </a:extLst>
+          </p:cNvPr>
+          <p:cNvPicPr>
+            <a:picLocks noGrp="1" noRot="1" noChangeAspect="1" noMove="1" noResize="1" noEditPoints="1" noAdjustHandles="1" noChangeArrowheads="1" noChangeShapeType="1" noCrop="1"/>
+          </p:cNvPicPr>
+          <p:nvPr>
+            <p:extLst>
+              <p:ext uri="{386F3935-93C4-4BCD-93E2-E3B085C9AB24}">
+                <p16:designElem xmlns:p16="http://schemas.microsoft.com/office/powerpoint/2015/main" val="1"/>
+              </p:ext>
+            </p:extLst>
+          </p:nvPr>
+        </p:nvPicPr>
+        <p:blipFill rotWithShape="1">
+          <a:blip r:embed="rId3">
+            <a:extLst>
+              <a:ext uri="{28A0092B-C50C-407E-A947-70E740481C1C}">
+                <a14:useLocalDpi xmlns:a14="http://schemas.microsoft.com/office/drawing/2010/main" val="0"/>
+              </a:ext>
+            </a:extLst>
+          </a:blip>
+          <a:srcRect t="1538" b="-1538"/>
+          <a:stretch/>
+        </p:blipFill>
+        <p:spPr bwMode="black">
+          <a:xfrm>
+            <a:off x="0" y="6126480"/>
+            <a:ext cx="12192000" cy="742950"/>
+          </a:xfrm>
+          <a:prstGeom prst="rect">
+            <a:avLst/>
+          </a:prstGeom>
+        </p:spPr>
+      </p:pic>
+      <p:cxnSp>
+        <p:nvCxnSpPr>
+          <p:cNvPr id="1063" name="Straight Connector 78">
+            <a:extLst>
+              <a:ext uri="{FF2B5EF4-FFF2-40B4-BE49-F238E27FC236}">
+                <a16:creationId xmlns:a16="http://schemas.microsoft.com/office/drawing/2014/main" id="{8063EF0F-7BC0-4CFB-AB98-20A8DD91D70F}"/>
+              </a:ext>
+              <a:ext uri="{C183D7F6-B498-43B3-948B-1728B52AA6E4}">
+                <adec:decorative xmlns:adec="http://schemas.microsoft.com/office/drawing/2017/decorative" val="1"/>
+              </a:ext>
+            </a:extLst>
+          </p:cNvPr>
+          <p:cNvCxnSpPr>
+            <a:cxnSpLocks noGrp="1" noRot="1" noChangeAspect="1" noMove="1" noResize="1" noEditPoints="1" noAdjustHandles="1" noChangeArrowheads="1" noChangeShapeType="1"/>
+          </p:cNvCxnSpPr>
+          <p:nvPr>
+            <p:extLst>
+              <p:ext uri="{386F3935-93C4-4BCD-93E2-E3B085C9AB24}">
+                <p16:designElem xmlns:p16="http://schemas.microsoft.com/office/powerpoint/2015/main" val="1"/>
+              </p:ext>
+            </p:extLst>
+          </p:nvPr>
+        </p:nvCxnSpPr>
+        <p:spPr>
+          <a:xfrm>
+            <a:off x="0" y="6128413"/>
+            <a:ext cx="12192000" cy="0"/>
+          </a:xfrm>
+          <a:prstGeom prst="line">
+            <a:avLst/>
+          </a:prstGeom>
+          <a:ln w="12700">
+            <a:solidFill>
+              <a:srgbClr val="000001">
+                <a:alpha val="20000"/>
+              </a:srgbClr>
+            </a:solidFill>
+          </a:ln>
+        </p:spPr>
+        <p:style>
+          <a:lnRef idx="1">
+            <a:schemeClr val="accent1"/>
+          </a:lnRef>
+          <a:fillRef idx="0">
+            <a:schemeClr val="accent1"/>
+          </a:fillRef>
+          <a:effectRef idx="0">
+            <a:schemeClr val="accent1"/>
+          </a:effectRef>
+          <a:fontRef idx="minor">
+            <a:schemeClr val="tx1"/>
+          </a:fontRef>
+        </p:style>
+      </p:cxnSp>
       <p:pic>
         <p:nvPicPr>
           <p:cNvPr id="1026" name="Picture 2" descr="StiWa Testsieger von Philips - News center | Philips">
@@ -5935,7 +6373,7 @@
           <p:nvPr/>
         </p:nvPicPr>
         <p:blipFill rotWithShape="1">
-          <a:blip r:embed="rId3">
+          <a:blip r:embed="rId4">
             <a:extLst>
               <a:ext uri="{28A0092B-C50C-407E-A947-70E740481C1C}">
                 <a14:useLocalDpi xmlns:a14="http://schemas.microsoft.com/office/drawing/2010/main" val="0"/>
@@ -5975,6 +6413,145 @@
   <p:clrMapOvr>
     <a:masterClrMapping/>
   </p:clrMapOvr>
+  <p:timing>
+    <p:tnLst>
+      <p:par>
+        <p:cTn id="1" dur="indefinite" restart="never" nodeType="tmRoot">
+          <p:childTnLst>
+            <p:seq concurrent="1" nextAc="seek">
+              <p:cTn id="2" dur="indefinite" nodeType="mainSeq">
+                <p:childTnLst>
+                  <p:par>
+                    <p:cTn id="3" fill="hold">
+                      <p:stCondLst>
+                        <p:cond delay="indefinite"/>
+                        <p:cond evt="onBegin" delay="0">
+                          <p:tn val="2"/>
+                        </p:cond>
+                      </p:stCondLst>
+                      <p:childTnLst>
+                        <p:par>
+                          <p:cTn id="4" fill="hold">
+                            <p:stCondLst>
+                              <p:cond delay="0"/>
+                            </p:stCondLst>
+                            <p:childTnLst>
+                              <p:par>
+                                <p:cTn id="5" presetID="10" presetClass="entr" presetSubtype="0" fill="hold" grpId="0" nodeType="withEffect">
+                                  <p:stCondLst>
+                                    <p:cond delay="2000"/>
+                                  </p:stCondLst>
+                                  <p:iterate type="lt">
+                                    <p:tmPct val="10000"/>
+                                  </p:iterate>
+                                  <p:childTnLst>
+                                    <p:set>
+                                      <p:cBhvr>
+                                        <p:cTn id="6" dur="1" fill="hold">
+                                          <p:stCondLst>
+                                            <p:cond delay="0"/>
+                                          </p:stCondLst>
+                                        </p:cTn>
+                                        <p:tgtEl>
+                                          <p:spTgt spid="3">
+                                            <p:txEl>
+                                              <p:pRg st="0" end="0"/>
+                                            </p:txEl>
+                                          </p:spTgt>
+                                        </p:tgtEl>
+                                        <p:attrNameLst>
+                                          <p:attrName>style.visibility</p:attrName>
+                                        </p:attrNameLst>
+                                      </p:cBhvr>
+                                      <p:to>
+                                        <p:strVal val="visible"/>
+                                      </p:to>
+                                    </p:set>
+                                    <p:animEffect transition="in" filter="fade">
+                                      <p:cBhvr>
+                                        <p:cTn id="7" dur="400"/>
+                                        <p:tgtEl>
+                                          <p:spTgt spid="3">
+                                            <p:txEl>
+                                              <p:pRg st="0" end="0"/>
+                                            </p:txEl>
+                                          </p:spTgt>
+                                        </p:tgtEl>
+                                      </p:cBhvr>
+                                    </p:animEffect>
+                                  </p:childTnLst>
+                                </p:cTn>
+                              </p:par>
+                              <p:par>
+                                <p:cTn id="8" presetID="10" presetClass="entr" presetSubtype="0" fill="hold" grpId="0" nodeType="withEffect">
+                                  <p:stCondLst>
+                                    <p:cond delay="1000"/>
+                                  </p:stCondLst>
+                                  <p:iterate type="lt">
+                                    <p:tmPct val="10000"/>
+                                  </p:iterate>
+                                  <p:childTnLst>
+                                    <p:set>
+                                      <p:cBhvr>
+                                        <p:cTn id="9" dur="1" fill="hold">
+                                          <p:stCondLst>
+                                            <p:cond delay="0"/>
+                                          </p:stCondLst>
+                                        </p:cTn>
+                                        <p:tgtEl>
+                                          <p:spTgt spid="2"/>
+                                        </p:tgtEl>
+                                        <p:attrNameLst>
+                                          <p:attrName>style.visibility</p:attrName>
+                                        </p:attrNameLst>
+                                      </p:cBhvr>
+                                      <p:to>
+                                        <p:strVal val="visible"/>
+                                      </p:to>
+                                    </p:set>
+                                    <p:animEffect transition="in" filter="fade">
+                                      <p:cBhvr>
+                                        <p:cTn id="10" dur="400"/>
+                                        <p:tgtEl>
+                                          <p:spTgt spid="2"/>
+                                        </p:tgtEl>
+                                      </p:cBhvr>
+                                    </p:animEffect>
+                                  </p:childTnLst>
+                                </p:cTn>
+                              </p:par>
+                            </p:childTnLst>
+                          </p:cTn>
+                        </p:par>
+                      </p:childTnLst>
+                    </p:cTn>
+                  </p:par>
+                </p:childTnLst>
+              </p:cTn>
+              <p:prevCondLst>
+                <p:cond evt="onPrev" delay="0">
+                  <p:tgtEl>
+                    <p:sldTgt/>
+                  </p:tgtEl>
+                </p:cond>
+              </p:prevCondLst>
+              <p:nextCondLst>
+                <p:cond evt="onNext" delay="0">
+                  <p:tgtEl>
+                    <p:sldTgt/>
+                  </p:tgtEl>
+                </p:cond>
+              </p:nextCondLst>
+            </p:seq>
+          </p:childTnLst>
+        </p:cTn>
+      </p:par>
+    </p:tnLst>
+    <p:bldLst>
+      <p:bldP spid="2" grpId="0"/>
+      <p:bldP spid="3" grpId="0" build="p"/>
+    </p:bldLst>
+  </p:timing>
 </p:sld>
 </file>
 
@@ -6557,29 +7134,29 @@
       </p:grpSpPr>
       <p:sp>
         <p:nvSpPr>
-          <p:cNvPr id="3" name="Inhaltsplatzhalter 2">
+          <p:cNvPr id="5" name="Textfeld 4">
             <a:extLst>
               <a:ext uri="{FF2B5EF4-FFF2-40B4-BE49-F238E27FC236}">
-                <a16:creationId xmlns:a16="http://schemas.microsoft.com/office/drawing/2014/main" id="{2BFDBE84-811B-47B4-970D-BE4B5148B21C}"/>
+                <a16:creationId xmlns:a16="http://schemas.microsoft.com/office/drawing/2014/main" id="{D9FE1176-799C-4659-87C7-E56B865FFAC6}"/>
               </a:ext>
             </a:extLst>
           </p:cNvPr>
-          <p:cNvSpPr>
-            <a:spLocks noGrp="1"/>
-          </p:cNvSpPr>
-          <p:nvPr>
-            <p:ph idx="1"/>
-          </p:nvPr>
+          <p:cNvSpPr txBox="1"/>
+          <p:nvPr/>
         </p:nvSpPr>
         <p:spPr>
           <a:xfrm>
-            <a:off x="2233530" y="2287875"/>
-            <a:ext cx="7724939" cy="3450613"/>
-          </a:xfrm>
-        </p:spPr>
-        <p:txBody>
-          <a:bodyPr>
-            <a:normAutofit/>
+            <a:off x="3581655" y="2595971"/>
+            <a:ext cx="5028690" cy="523220"/>
+          </a:xfrm>
+          <a:prstGeom prst="rect">
+            <a:avLst/>
+          </a:prstGeom>
+          <a:noFill/>
+        </p:spPr>
+        <p:txBody>
+          <a:bodyPr wrap="square">
+            <a:spAutoFit/>
           </a:bodyPr>
           <a:lstStyle/>
           <a:p>
@@ -6588,94 +7165,156 @@
                 <a:latin typeface="Arial" panose="020B0604020202020204" pitchFamily="34" charset="0"/>
                 <a:cs typeface="Arial" panose="020B0604020202020204" pitchFamily="34" charset="0"/>
               </a:rPr>
-              <a:t>Notizen zum Beispiel für Geschenke etc.</a:t>
-            </a:r>
-          </a:p>
-          <a:p>
-            <a:r>
-              <a:rPr lang="de-DE" sz="2800" dirty="0">
-                <a:latin typeface="Arial" panose="020B0604020202020204" pitchFamily="34" charset="0"/>
-                <a:cs typeface="Arial" panose="020B0604020202020204" pitchFamily="34" charset="0"/>
-              </a:rPr>
-              <a:t>Dauerhafte Speicherung der Geburtstage</a:t>
-            </a:r>
-          </a:p>
-          <a:p>
-            <a:r>
-              <a:rPr lang="de-DE" sz="2800" dirty="0">
-                <a:latin typeface="Arial" panose="020B0604020202020204" pitchFamily="34" charset="0"/>
-                <a:cs typeface="Arial" panose="020B0604020202020204" pitchFamily="34" charset="0"/>
-              </a:rPr>
-              <a:t>Barrierefrei</a:t>
-            </a:r>
-          </a:p>
-          <a:p>
-            <a:r>
-              <a:rPr lang="de-DE" sz="2800" dirty="0">
-                <a:latin typeface="Arial" panose="020B0604020202020204" pitchFamily="34" charset="0"/>
-                <a:cs typeface="Arial" panose="020B0604020202020204" pitchFamily="34" charset="0"/>
-              </a:rPr>
-              <a:t>Responsive</a:t>
-            </a:r>
-          </a:p>
-          <a:p>
-            <a:r>
-              <a:rPr lang="de-DE" sz="2800" dirty="0">
-                <a:latin typeface="Arial" panose="020B0604020202020204" pitchFamily="34" charset="0"/>
-                <a:cs typeface="Arial" panose="020B0604020202020204" pitchFamily="34" charset="0"/>
-              </a:rPr>
-              <a:t>Einzigartiges Design</a:t>
-            </a:r>
-          </a:p>
-          <a:p>
-            <a:endParaRPr lang="de-DE" sz="2800" dirty="0">
-              <a:latin typeface="Arial" panose="020B0604020202020204" pitchFamily="34" charset="0"/>
-              <a:cs typeface="Arial" panose="020B0604020202020204" pitchFamily="34" charset="0"/>
-            </a:endParaRPr>
-          </a:p>
-          <a:p>
-            <a:endParaRPr lang="de-DE" sz="2800" dirty="0">
-              <a:latin typeface="Arial" panose="020B0604020202020204" pitchFamily="34" charset="0"/>
-              <a:cs typeface="Arial" panose="020B0604020202020204" pitchFamily="34" charset="0"/>
-            </a:endParaRPr>
-          </a:p>
-        </p:txBody>
-      </p:sp>
-      <p:sp>
-        <p:nvSpPr>
-          <p:cNvPr id="8" name="Titel 1">
+              <a:t>Countdown für Geburtstage</a:t>
+            </a:r>
+          </a:p>
+        </p:txBody>
+      </p:sp>
+      <p:pic>
+        <p:nvPicPr>
+          <p:cNvPr id="10" name="Grafik 9">
             <a:extLst>
               <a:ext uri="{FF2B5EF4-FFF2-40B4-BE49-F238E27FC236}">
-                <a16:creationId xmlns:a16="http://schemas.microsoft.com/office/drawing/2014/main" id="{B7D29FA3-DFFE-4E80-8213-565E511F1DD8}"/>
+                <a16:creationId xmlns:a16="http://schemas.microsoft.com/office/drawing/2014/main" id="{C2A30B5E-C9E1-4BDA-9CA2-B026FE86AFA1}"/>
               </a:ext>
             </a:extLst>
           </p:cNvPr>
-          <p:cNvSpPr>
-            <a:spLocks noGrp="1"/>
-          </p:cNvSpPr>
-          <p:nvPr>
-            <p:ph type="title"/>
-          </p:nvPr>
+          <p:cNvPicPr>
+            <a:picLocks noChangeAspect="1"/>
+          </p:cNvPicPr>
+          <p:nvPr/>
+        </p:nvPicPr>
+        <p:blipFill>
+          <a:blip r:embed="rId2"/>
+          <a:stretch>
+            <a:fillRect/>
+          </a:stretch>
+        </p:blipFill>
+        <p:spPr>
+          <a:xfrm>
+            <a:off x="725789" y="3507857"/>
+            <a:ext cx="11054854" cy="1741078"/>
+          </a:xfrm>
+          <a:prstGeom prst="rect">
+            <a:avLst/>
+          </a:prstGeom>
+        </p:spPr>
+      </p:pic>
+      <p:sp>
+        <p:nvSpPr>
+          <p:cNvPr id="11" name="Rechteck 10">
+            <a:extLst>
+              <a:ext uri="{FF2B5EF4-FFF2-40B4-BE49-F238E27FC236}">
+                <a16:creationId xmlns:a16="http://schemas.microsoft.com/office/drawing/2014/main" id="{56AB84E2-B8CB-4D5E-ADA0-26AC5240A19B}"/>
+              </a:ext>
+            </a:extLst>
+          </p:cNvPr>
+          <p:cNvSpPr/>
+          <p:nvPr/>
+        </p:nvSpPr>
+        <p:spPr>
+          <a:xfrm>
+            <a:off x="10994571" y="3507857"/>
+            <a:ext cx="786072" cy="1741078"/>
+          </a:xfrm>
+          <a:prstGeom prst="rect">
+            <a:avLst/>
+          </a:prstGeom>
+          <a:noFill/>
+          <a:ln w="76200">
+            <a:solidFill>
+              <a:srgbClr val="FF0000"/>
+            </a:solidFill>
+          </a:ln>
+        </p:spPr>
+        <p:style>
+          <a:lnRef idx="2">
+            <a:schemeClr val="accent1">
+              <a:shade val="50000"/>
+            </a:schemeClr>
+          </a:lnRef>
+          <a:fillRef idx="1">
+            <a:schemeClr val="accent1"/>
+          </a:fillRef>
+          <a:effectRef idx="0">
+            <a:schemeClr val="accent1"/>
+          </a:effectRef>
+          <a:fontRef idx="minor">
+            <a:schemeClr val="lt1"/>
+          </a:fontRef>
+        </p:style>
+        <p:txBody>
+          <a:bodyPr rtlCol="0" anchor="ctr"/>
+          <a:lstStyle/>
+          <a:p>
+            <a:pPr algn="ctr"/>
+            <a:endParaRPr lang="en-US">
+              <a:solidFill>
+                <a:srgbClr val="FF9966"/>
+              </a:solidFill>
+            </a:endParaRPr>
+          </a:p>
+        </p:txBody>
+      </p:sp>
+      <p:sp>
+        <p:nvSpPr>
+          <p:cNvPr id="17" name="Titel 1">
+            <a:extLst>
+              <a:ext uri="{FF2B5EF4-FFF2-40B4-BE49-F238E27FC236}">
+                <a16:creationId xmlns:a16="http://schemas.microsoft.com/office/drawing/2014/main" id="{52E08D60-C9AA-44FF-A4CE-8A23891B259F}"/>
+              </a:ext>
+            </a:extLst>
+          </p:cNvPr>
+          <p:cNvSpPr txBox="1">
+            <a:spLocks/>
+          </p:cNvSpPr>
+          <p:nvPr/>
         </p:nvSpPr>
         <p:spPr>
           <a:xfrm>
             <a:off x="3801562" y="852286"/>
             <a:ext cx="4588876" cy="1049235"/>
           </a:xfrm>
-        </p:spPr>
-        <p:txBody>
-          <a:bodyPr>
+          <a:prstGeom prst="rect">
+            <a:avLst/>
+          </a:prstGeom>
+        </p:spPr>
+        <p:txBody>
+          <a:bodyPr vert="horz" lIns="91440" tIns="45720" rIns="91440" bIns="45720" rtlCol="0" anchor="t">
             <a:noAutofit/>
           </a:bodyPr>
-          <a:lstStyle/>
-          <a:p>
-            <a:r>
-              <a:rPr lang="de-DE" sz="4000" dirty="0">
+          <a:lstStyle>
+            <a:lvl1pPr algn="l" defTabSz="914400" rtl="0" eaLnBrk="1" latinLnBrk="0" hangingPunct="1">
+              <a:lnSpc>
+                <a:spcPct val="90000"/>
+              </a:lnSpc>
+              <a:spcBef>
+                <a:spcPct val="0"/>
+              </a:spcBef>
+              <a:buNone/>
+              <a:defRPr sz="3200" b="0" i="0" kern="1200" cap="all">
+                <a:solidFill>
+                  <a:schemeClr val="tx1"/>
+                </a:solidFill>
+                <a:effectLst/>
+                <a:latin typeface="+mj-lt"/>
+                <a:ea typeface="+mj-ea"/>
+                <a:cs typeface="+mj-cs"/>
+              </a:defRPr>
+            </a:lvl1pPr>
+          </a:lstStyle>
+          <a:p>
+            <a:r>
+              <a:rPr lang="de-DE" sz="4000">
                 <a:latin typeface="Arial" panose="020B0604020202020204" pitchFamily="34" charset="0"/>
                 <a:cs typeface="Arial" panose="020B0604020202020204" pitchFamily="34" charset="0"/>
               </a:rPr>
               <a:t>Funktionalität</a:t>
             </a:r>
+            <a:endParaRPr lang="de-DE" sz="4000" dirty="0">
+              <a:latin typeface="Arial" panose="020B0604020202020204" pitchFamily="34" charset="0"/>
+              <a:cs typeface="Arial" panose="020B0604020202020204" pitchFamily="34" charset="0"/>
+            </a:endParaRPr>
           </a:p>
         </p:txBody>
       </p:sp>
@@ -6684,7 +7323,7 @@
           <p:cNvPr id="2" name="Foliennummernplatzhalter 1">
             <a:extLst>
               <a:ext uri="{FF2B5EF4-FFF2-40B4-BE49-F238E27FC236}">
-                <a16:creationId xmlns:a16="http://schemas.microsoft.com/office/drawing/2014/main" id="{164EA0FC-F885-40C2-BE1C-71B4DBA34CB6}"/>
+                <a16:creationId xmlns:a16="http://schemas.microsoft.com/office/drawing/2014/main" id="{37607B81-B19A-43BD-9897-5A0593DDF25B}"/>
               </a:ext>
             </a:extLst>
           </p:cNvPr>
@@ -6711,7 +7350,7 @@
     </p:spTree>
     <p:extLst>
       <p:ext uri="{BB962C8B-B14F-4D97-AF65-F5344CB8AC3E}">
-        <p14:creationId xmlns:p14="http://schemas.microsoft.com/office/powerpoint/2010/main" val="258373187"/>
+        <p14:creationId xmlns:p14="http://schemas.microsoft.com/office/powerpoint/2010/main" val="2907684737"/>
       </p:ext>
     </p:extLst>
   </p:cSld>
@@ -6752,8 +7391,8 @@
         </p:nvSpPr>
         <p:spPr>
           <a:xfrm>
-            <a:off x="3581655" y="2595971"/>
-            <a:ext cx="5028690" cy="523220"/>
+            <a:off x="3437956" y="2399428"/>
+            <a:ext cx="5316086" cy="523220"/>
           </a:xfrm>
           <a:prstGeom prst="rect">
             <a:avLst/>
@@ -6771,17 +7410,17 @@
                 <a:latin typeface="Arial" panose="020B0604020202020204" pitchFamily="34" charset="0"/>
                 <a:cs typeface="Arial" panose="020B0604020202020204" pitchFamily="34" charset="0"/>
               </a:rPr>
-              <a:t>Countdown für Geburtstage</a:t>
+              <a:t>Alter der Person wird angezeigt</a:t>
             </a:r>
           </a:p>
         </p:txBody>
       </p:sp>
       <p:pic>
         <p:nvPicPr>
-          <p:cNvPr id="10" name="Grafik 9">
+          <p:cNvPr id="4" name="Grafik 3">
             <a:extLst>
               <a:ext uri="{FF2B5EF4-FFF2-40B4-BE49-F238E27FC236}">
-                <a16:creationId xmlns:a16="http://schemas.microsoft.com/office/drawing/2014/main" id="{C2A30B5E-C9E1-4BDA-9CA2-B026FE86AFA1}"/>
+                <a16:creationId xmlns:a16="http://schemas.microsoft.com/office/drawing/2014/main" id="{34C5D1F0-A2DD-4B50-8585-576B6D3999EA}"/>
               </a:ext>
             </a:extLst>
           </p:cNvPr>
@@ -6790,16 +7429,15 @@
           </p:cNvPicPr>
           <p:nvPr/>
         </p:nvPicPr>
-        <p:blipFill>
+        <p:blipFill rotWithShape="1">
           <a:blip r:embed="rId2"/>
-          <a:stretch>
-            <a:fillRect/>
-          </a:stretch>
+          <a:srcRect l="1" r="-786" b="33878"/>
+          <a:stretch/>
         </p:blipFill>
         <p:spPr>
           <a:xfrm>
-            <a:off x="725789" y="3507857"/>
-            <a:ext cx="11054854" cy="1741078"/>
+            <a:off x="2881337" y="3265441"/>
+            <a:ext cx="6429325" cy="3356358"/>
           </a:xfrm>
           <a:prstGeom prst="rect">
             <a:avLst/>
@@ -6808,10 +7446,10 @@
       </p:pic>
       <p:sp>
         <p:nvSpPr>
-          <p:cNvPr id="11" name="Rechteck 10">
+          <p:cNvPr id="9" name="Rechteck 8">
             <a:extLst>
               <a:ext uri="{FF2B5EF4-FFF2-40B4-BE49-F238E27FC236}">
-                <a16:creationId xmlns:a16="http://schemas.microsoft.com/office/drawing/2014/main" id="{56AB84E2-B8CB-4D5E-ADA0-26AC5240A19B}"/>
+                <a16:creationId xmlns:a16="http://schemas.microsoft.com/office/drawing/2014/main" id="{D7AB4C7E-B566-40BE-87C8-C0F7080B7448}"/>
               </a:ext>
             </a:extLst>
           </p:cNvPr>
@@ -6820,8 +7458,8 @@
         </p:nvSpPr>
         <p:spPr>
           <a:xfrm>
-            <a:off x="10994571" y="3507857"/>
-            <a:ext cx="786072" cy="1741078"/>
+            <a:off x="5732060" y="3951027"/>
+            <a:ext cx="914192" cy="552734"/>
           </a:xfrm>
           <a:prstGeom prst="rect">
             <a:avLst/>
@@ -6864,10 +7502,10 @@
       </p:sp>
       <p:sp>
         <p:nvSpPr>
-          <p:cNvPr id="17" name="Titel 1">
+          <p:cNvPr id="15" name="Titel 1">
             <a:extLst>
               <a:ext uri="{FF2B5EF4-FFF2-40B4-BE49-F238E27FC236}">
-                <a16:creationId xmlns:a16="http://schemas.microsoft.com/office/drawing/2014/main" id="{52E08D60-C9AA-44FF-A4CE-8A23891B259F}"/>
+                <a16:creationId xmlns:a16="http://schemas.microsoft.com/office/drawing/2014/main" id="{25E87593-B6B4-474A-9FF4-4057E5FD8398}"/>
               </a:ext>
             </a:extLst>
           </p:cNvPr>
@@ -6929,7 +7567,7 @@
           <p:cNvPr id="2" name="Foliennummernplatzhalter 1">
             <a:extLst>
               <a:ext uri="{FF2B5EF4-FFF2-40B4-BE49-F238E27FC236}">
-                <a16:creationId xmlns:a16="http://schemas.microsoft.com/office/drawing/2014/main" id="{37607B81-B19A-43BD-9897-5A0593DDF25B}"/>
+                <a16:creationId xmlns:a16="http://schemas.microsoft.com/office/drawing/2014/main" id="{E7B3D49B-B85B-4B10-9C60-B9C331D1FF26}"/>
               </a:ext>
             </a:extLst>
           </p:cNvPr>
@@ -6956,7 +7594,7 @@
     </p:spTree>
     <p:extLst>
       <p:ext uri="{BB962C8B-B14F-4D97-AF65-F5344CB8AC3E}">
-        <p14:creationId xmlns:p14="http://schemas.microsoft.com/office/powerpoint/2010/main" val="2907684737"/>
+        <p14:creationId xmlns:p14="http://schemas.microsoft.com/office/powerpoint/2010/main" val="1087184006"/>
       </p:ext>
     </p:extLst>
   </p:cSld>
@@ -6985,29 +7623,29 @@
       </p:grpSpPr>
       <p:sp>
         <p:nvSpPr>
-          <p:cNvPr id="5" name="Textfeld 4">
+          <p:cNvPr id="3" name="Inhaltsplatzhalter 2">
             <a:extLst>
               <a:ext uri="{FF2B5EF4-FFF2-40B4-BE49-F238E27FC236}">
-                <a16:creationId xmlns:a16="http://schemas.microsoft.com/office/drawing/2014/main" id="{D9FE1176-799C-4659-87C7-E56B865FFAC6}"/>
+                <a16:creationId xmlns:a16="http://schemas.microsoft.com/office/drawing/2014/main" id="{2BFDBE84-811B-47B4-970D-BE4B5148B21C}"/>
               </a:ext>
             </a:extLst>
           </p:cNvPr>
-          <p:cNvSpPr txBox="1"/>
-          <p:nvPr/>
+          <p:cNvSpPr>
+            <a:spLocks noGrp="1"/>
+          </p:cNvSpPr>
+          <p:nvPr>
+            <p:ph idx="1"/>
+          </p:nvPr>
         </p:nvSpPr>
         <p:spPr>
           <a:xfrm>
-            <a:off x="3437956" y="2399428"/>
-            <a:ext cx="5316086" cy="523220"/>
-          </a:xfrm>
-          <a:prstGeom prst="rect">
-            <a:avLst/>
-          </a:prstGeom>
-          <a:noFill/>
-        </p:spPr>
-        <p:txBody>
-          <a:bodyPr wrap="square">
-            <a:spAutoFit/>
+            <a:off x="2233530" y="2287875"/>
+            <a:ext cx="7724939" cy="3450613"/>
+          </a:xfrm>
+        </p:spPr>
+        <p:txBody>
+          <a:bodyPr>
+            <a:normAutofit/>
           </a:bodyPr>
           <a:lstStyle/>
           <a:p>
@@ -7016,155 +7654,94 @@
                 <a:latin typeface="Arial" panose="020B0604020202020204" pitchFamily="34" charset="0"/>
                 <a:cs typeface="Arial" panose="020B0604020202020204" pitchFamily="34" charset="0"/>
               </a:rPr>
-              <a:t>Alter der Person wird angezeigt</a:t>
-            </a:r>
-          </a:p>
-        </p:txBody>
-      </p:sp>
-      <p:pic>
-        <p:nvPicPr>
-          <p:cNvPr id="4" name="Grafik 3">
+              <a:t>Notizen zum Beispiel für Geschenke etc.</a:t>
+            </a:r>
+          </a:p>
+          <a:p>
+            <a:r>
+              <a:rPr lang="de-DE" sz="2800" dirty="0">
+                <a:latin typeface="Arial" panose="020B0604020202020204" pitchFamily="34" charset="0"/>
+                <a:cs typeface="Arial" panose="020B0604020202020204" pitchFamily="34" charset="0"/>
+              </a:rPr>
+              <a:t>Dauerhafte Speicherung der Geburtstage</a:t>
+            </a:r>
+          </a:p>
+          <a:p>
+            <a:r>
+              <a:rPr lang="de-DE" sz="2800" dirty="0">
+                <a:latin typeface="Arial" panose="020B0604020202020204" pitchFamily="34" charset="0"/>
+                <a:cs typeface="Arial" panose="020B0604020202020204" pitchFamily="34" charset="0"/>
+              </a:rPr>
+              <a:t>Barrierefrei</a:t>
+            </a:r>
+          </a:p>
+          <a:p>
+            <a:r>
+              <a:rPr lang="de-DE" sz="2800" dirty="0">
+                <a:latin typeface="Arial" panose="020B0604020202020204" pitchFamily="34" charset="0"/>
+                <a:cs typeface="Arial" panose="020B0604020202020204" pitchFamily="34" charset="0"/>
+              </a:rPr>
+              <a:t>Responsive</a:t>
+            </a:r>
+          </a:p>
+          <a:p>
+            <a:r>
+              <a:rPr lang="de-DE" sz="2800" dirty="0">
+                <a:latin typeface="Arial" panose="020B0604020202020204" pitchFamily="34" charset="0"/>
+                <a:cs typeface="Arial" panose="020B0604020202020204" pitchFamily="34" charset="0"/>
+              </a:rPr>
+              <a:t>Einzigartiges Design</a:t>
+            </a:r>
+          </a:p>
+          <a:p>
+            <a:endParaRPr lang="de-DE" sz="2800" dirty="0">
+              <a:latin typeface="Arial" panose="020B0604020202020204" pitchFamily="34" charset="0"/>
+              <a:cs typeface="Arial" panose="020B0604020202020204" pitchFamily="34" charset="0"/>
+            </a:endParaRPr>
+          </a:p>
+          <a:p>
+            <a:endParaRPr lang="de-DE" sz="2800" dirty="0">
+              <a:latin typeface="Arial" panose="020B0604020202020204" pitchFamily="34" charset="0"/>
+              <a:cs typeface="Arial" panose="020B0604020202020204" pitchFamily="34" charset="0"/>
+            </a:endParaRPr>
+          </a:p>
+        </p:txBody>
+      </p:sp>
+      <p:sp>
+        <p:nvSpPr>
+          <p:cNvPr id="8" name="Titel 1">
             <a:extLst>
               <a:ext uri="{FF2B5EF4-FFF2-40B4-BE49-F238E27FC236}">
-                <a16:creationId xmlns:a16="http://schemas.microsoft.com/office/drawing/2014/main" id="{34C5D1F0-A2DD-4B50-8585-576B6D3999EA}"/>
+                <a16:creationId xmlns:a16="http://schemas.microsoft.com/office/drawing/2014/main" id="{B7D29FA3-DFFE-4E80-8213-565E511F1DD8}"/>
               </a:ext>
             </a:extLst>
           </p:cNvPr>
-          <p:cNvPicPr>
-            <a:picLocks noChangeAspect="1"/>
-          </p:cNvPicPr>
-          <p:nvPr/>
-        </p:nvPicPr>
-        <p:blipFill rotWithShape="1">
-          <a:blip r:embed="rId2"/>
-          <a:srcRect l="1" r="-786" b="33878"/>
-          <a:stretch/>
-        </p:blipFill>
-        <p:spPr>
-          <a:xfrm>
-            <a:off x="2881337" y="3265441"/>
-            <a:ext cx="6429325" cy="3356358"/>
-          </a:xfrm>
-          <a:prstGeom prst="rect">
-            <a:avLst/>
-          </a:prstGeom>
-        </p:spPr>
-      </p:pic>
-      <p:sp>
-        <p:nvSpPr>
-          <p:cNvPr id="9" name="Rechteck 8">
-            <a:extLst>
-              <a:ext uri="{FF2B5EF4-FFF2-40B4-BE49-F238E27FC236}">
-                <a16:creationId xmlns:a16="http://schemas.microsoft.com/office/drawing/2014/main" id="{D7AB4C7E-B566-40BE-87C8-C0F7080B7448}"/>
-              </a:ext>
-            </a:extLst>
-          </p:cNvPr>
-          <p:cNvSpPr/>
-          <p:nvPr/>
-        </p:nvSpPr>
-        <p:spPr>
-          <a:xfrm>
-            <a:off x="5732060" y="3951027"/>
-            <a:ext cx="914192" cy="552734"/>
-          </a:xfrm>
-          <a:prstGeom prst="rect">
-            <a:avLst/>
-          </a:prstGeom>
-          <a:noFill/>
-          <a:ln w="76200">
-            <a:solidFill>
-              <a:srgbClr val="FF0000"/>
-            </a:solidFill>
-          </a:ln>
-        </p:spPr>
-        <p:style>
-          <a:lnRef idx="2">
-            <a:schemeClr val="accent1">
-              <a:shade val="50000"/>
-            </a:schemeClr>
-          </a:lnRef>
-          <a:fillRef idx="1">
-            <a:schemeClr val="accent1"/>
-          </a:fillRef>
-          <a:effectRef idx="0">
-            <a:schemeClr val="accent1"/>
-          </a:effectRef>
-          <a:fontRef idx="minor">
-            <a:schemeClr val="lt1"/>
-          </a:fontRef>
-        </p:style>
-        <p:txBody>
-          <a:bodyPr rtlCol="0" anchor="ctr"/>
-          <a:lstStyle/>
-          <a:p>
-            <a:pPr algn="ctr"/>
-            <a:endParaRPr lang="en-US">
-              <a:solidFill>
-                <a:srgbClr val="FF9966"/>
-              </a:solidFill>
-            </a:endParaRPr>
-          </a:p>
-        </p:txBody>
-      </p:sp>
-      <p:sp>
-        <p:nvSpPr>
-          <p:cNvPr id="15" name="Titel 1">
-            <a:extLst>
-              <a:ext uri="{FF2B5EF4-FFF2-40B4-BE49-F238E27FC236}">
-                <a16:creationId xmlns:a16="http://schemas.microsoft.com/office/drawing/2014/main" id="{25E87593-B6B4-474A-9FF4-4057E5FD8398}"/>
-              </a:ext>
-            </a:extLst>
-          </p:cNvPr>
-          <p:cNvSpPr txBox="1">
-            <a:spLocks/>
-          </p:cNvSpPr>
-          <p:nvPr/>
+          <p:cNvSpPr>
+            <a:spLocks noGrp="1"/>
+          </p:cNvSpPr>
+          <p:nvPr>
+            <p:ph type="title"/>
+          </p:nvPr>
         </p:nvSpPr>
         <p:spPr>
           <a:xfrm>
             <a:off x="3801562" y="852286"/>
             <a:ext cx="4588876" cy="1049235"/>
           </a:xfrm>
-          <a:prstGeom prst="rect">
-            <a:avLst/>
-          </a:prstGeom>
-        </p:spPr>
-        <p:txBody>
-          <a:bodyPr vert="horz" lIns="91440" tIns="45720" rIns="91440" bIns="45720" rtlCol="0" anchor="t">
+        </p:spPr>
+        <p:txBody>
+          <a:bodyPr>
             <a:noAutofit/>
           </a:bodyPr>
-          <a:lstStyle>
-            <a:lvl1pPr algn="l" defTabSz="914400" rtl="0" eaLnBrk="1" latinLnBrk="0" hangingPunct="1">
-              <a:lnSpc>
-                <a:spcPct val="90000"/>
-              </a:lnSpc>
-              <a:spcBef>
-                <a:spcPct val="0"/>
-              </a:spcBef>
-              <a:buNone/>
-              <a:defRPr sz="3200" b="0" i="0" kern="1200" cap="all">
-                <a:solidFill>
-                  <a:schemeClr val="tx1"/>
-                </a:solidFill>
-                <a:effectLst/>
-                <a:latin typeface="+mj-lt"/>
-                <a:ea typeface="+mj-ea"/>
-                <a:cs typeface="+mj-cs"/>
-              </a:defRPr>
-            </a:lvl1pPr>
-          </a:lstStyle>
-          <a:p>
-            <a:r>
-              <a:rPr lang="de-DE" sz="4000">
+          <a:lstStyle/>
+          <a:p>
+            <a:r>
+              <a:rPr lang="de-DE" sz="4000" dirty="0">
                 <a:latin typeface="Arial" panose="020B0604020202020204" pitchFamily="34" charset="0"/>
                 <a:cs typeface="Arial" panose="020B0604020202020204" pitchFamily="34" charset="0"/>
               </a:rPr>
               <a:t>Funktionalität</a:t>
             </a:r>
-            <a:endParaRPr lang="de-DE" sz="4000" dirty="0">
-              <a:latin typeface="Arial" panose="020B0604020202020204" pitchFamily="34" charset="0"/>
-              <a:cs typeface="Arial" panose="020B0604020202020204" pitchFamily="34" charset="0"/>
-            </a:endParaRPr>
           </a:p>
         </p:txBody>
       </p:sp>
@@ -7173,7 +7750,7 @@
           <p:cNvPr id="2" name="Foliennummernplatzhalter 1">
             <a:extLst>
               <a:ext uri="{FF2B5EF4-FFF2-40B4-BE49-F238E27FC236}">
-                <a16:creationId xmlns:a16="http://schemas.microsoft.com/office/drawing/2014/main" id="{E7B3D49B-B85B-4B10-9C60-B9C331D1FF26}"/>
+                <a16:creationId xmlns:a16="http://schemas.microsoft.com/office/drawing/2014/main" id="{164EA0FC-F885-40C2-BE1C-71B4DBA34CB6}"/>
               </a:ext>
             </a:extLst>
           </p:cNvPr>
@@ -7200,7 +7777,7 @@
     </p:spTree>
     <p:extLst>
       <p:ext uri="{BB962C8B-B14F-4D97-AF65-F5344CB8AC3E}">
-        <p14:creationId xmlns:p14="http://schemas.microsoft.com/office/powerpoint/2010/main" val="1087184006"/>
+        <p14:creationId xmlns:p14="http://schemas.microsoft.com/office/powerpoint/2010/main" val="258373187"/>
       </p:ext>
     </p:extLst>
   </p:cSld>

</xml_diff>